<commit_message>
Changes agreed on review meeting
git-svn-id: http://source.gemini.edu/software/giapi/giapi-osgi/trunk@35263 ee6ba543-07f8-4773-b02c-01d50e9d00ba
</commit_message>
<xml_diff>
--- a/gds-api/src/main/doc/GDSDesignReview.pptx
+++ b/gds-api/src/main/doc/GDSDesignReview.pptx
@@ -7,26 +7,32 @@
   <p:sldIdLst>
     <p:sldId id="256" r:id="rId2"/>
     <p:sldId id="257" r:id="rId3"/>
-    <p:sldId id="258" r:id="rId4"/>
-    <p:sldId id="259" r:id="rId5"/>
-    <p:sldId id="260" r:id="rId6"/>
-    <p:sldId id="261" r:id="rId7"/>
-    <p:sldId id="262" r:id="rId8"/>
-    <p:sldId id="263" r:id="rId9"/>
-    <p:sldId id="264" r:id="rId10"/>
-    <p:sldId id="265" r:id="rId11"/>
-    <p:sldId id="276" r:id="rId12"/>
-    <p:sldId id="277" r:id="rId13"/>
-    <p:sldId id="278" r:id="rId14"/>
-    <p:sldId id="266" r:id="rId15"/>
-    <p:sldId id="268" r:id="rId16"/>
-    <p:sldId id="269" r:id="rId17"/>
-    <p:sldId id="270" r:id="rId18"/>
-    <p:sldId id="271" r:id="rId19"/>
-    <p:sldId id="272" r:id="rId20"/>
-    <p:sldId id="273" r:id="rId21"/>
-    <p:sldId id="274" r:id="rId22"/>
-    <p:sldId id="275" r:id="rId23"/>
+    <p:sldId id="281" r:id="rId4"/>
+    <p:sldId id="258" r:id="rId5"/>
+    <p:sldId id="259" r:id="rId6"/>
+    <p:sldId id="260" r:id="rId7"/>
+    <p:sldId id="282" r:id="rId8"/>
+    <p:sldId id="279" r:id="rId9"/>
+    <p:sldId id="262" r:id="rId10"/>
+    <p:sldId id="283" r:id="rId11"/>
+    <p:sldId id="261" r:id="rId12"/>
+    <p:sldId id="263" r:id="rId13"/>
+    <p:sldId id="284" r:id="rId14"/>
+    <p:sldId id="280" r:id="rId15"/>
+    <p:sldId id="265" r:id="rId16"/>
+    <p:sldId id="276" r:id="rId17"/>
+    <p:sldId id="277" r:id="rId18"/>
+    <p:sldId id="278" r:id="rId19"/>
+    <p:sldId id="266" r:id="rId20"/>
+    <p:sldId id="285" r:id="rId21"/>
+    <p:sldId id="268" r:id="rId22"/>
+    <p:sldId id="269" r:id="rId23"/>
+    <p:sldId id="270" r:id="rId24"/>
+    <p:sldId id="271" r:id="rId25"/>
+    <p:sldId id="275" r:id="rId26"/>
+    <p:sldId id="273" r:id="rId27"/>
+    <p:sldId id="274" r:id="rId28"/>
+    <p:sldId id="272" r:id="rId29"/>
   </p:sldIdLst>
   <p:sldSz cx="9144000" cy="6858000" type="screen4x3"/>
   <p:notesSz cx="6858000" cy="9144000"/>
@@ -365,7 +371,7 @@
             <a:fld id="{BB34CB12-3636-E74F-AC6D-0713EE8E1F4A}" type="datetimeFigureOut">
               <a:rPr lang="en-US" smtClean="0"/>
               <a:pPr/>
-              <a:t>5/31/11</a:t>
+              <a:t>6/1/11</a:t>
             </a:fld>
             <a:endParaRPr lang="en-US"/>
           </a:p>
@@ -457,7 +463,7 @@
             <a:fld id="{BB34CB12-3636-E74F-AC6D-0713EE8E1F4A}" type="datetimeFigureOut">
               <a:rPr lang="en-US" smtClean="0"/>
               <a:pPr/>
-              <a:t>5/31/11</a:t>
+              <a:t>6/1/11</a:t>
             </a:fld>
             <a:endParaRPr lang="en-US"/>
           </a:p>
@@ -759,7 +765,7 @@
             <a:fld id="{BB34CB12-3636-E74F-AC6D-0713EE8E1F4A}" type="datetimeFigureOut">
               <a:rPr lang="en-US" smtClean="0"/>
               <a:pPr/>
-              <a:t>5/31/11</a:t>
+              <a:t>6/1/11</a:t>
             </a:fld>
             <a:endParaRPr lang="en-US"/>
           </a:p>
@@ -979,7 +985,7 @@
             <a:fld id="{BB34CB12-3636-E74F-AC6D-0713EE8E1F4A}" type="datetimeFigureOut">
               <a:rPr lang="en-US" smtClean="0"/>
               <a:pPr/>
-              <a:t>5/31/11</a:t>
+              <a:t>6/1/11</a:t>
             </a:fld>
             <a:endParaRPr lang="en-US"/>
           </a:p>
@@ -1366,7 +1372,7 @@
             <a:fld id="{BB34CB12-3636-E74F-AC6D-0713EE8E1F4A}" type="datetimeFigureOut">
               <a:rPr lang="en-US" smtClean="0"/>
               <a:pPr/>
-              <a:t>5/31/11</a:t>
+              <a:t>6/1/11</a:t>
             </a:fld>
             <a:endParaRPr lang="en-US"/>
           </a:p>
@@ -1676,7 +1682,7 @@
             <a:fld id="{BB34CB12-3636-E74F-AC6D-0713EE8E1F4A}" type="datetimeFigureOut">
               <a:rPr lang="en-US" smtClean="0"/>
               <a:pPr/>
-              <a:t>5/31/11</a:t>
+              <a:t>6/1/11</a:t>
             </a:fld>
             <a:endParaRPr lang="en-US"/>
           </a:p>
@@ -1872,7 +1878,7 @@
             <a:fld id="{BB34CB12-3636-E74F-AC6D-0713EE8E1F4A}" type="datetimeFigureOut">
               <a:rPr lang="en-US" smtClean="0"/>
               <a:pPr/>
-              <a:t>5/31/11</a:t>
+              <a:t>6/1/11</a:t>
             </a:fld>
             <a:endParaRPr lang="en-US"/>
           </a:p>
@@ -2073,7 +2079,7 @@
             <a:fld id="{BB34CB12-3636-E74F-AC6D-0713EE8E1F4A}" type="datetimeFigureOut">
               <a:rPr lang="en-US" smtClean="0"/>
               <a:pPr/>
-              <a:t>5/31/11</a:t>
+              <a:t>6/1/11</a:t>
             </a:fld>
             <a:endParaRPr lang="en-US"/>
           </a:p>
@@ -2264,7 +2270,7 @@
             <a:fld id="{BB34CB12-3636-E74F-AC6D-0713EE8E1F4A}" type="datetimeFigureOut">
               <a:rPr lang="en-US" smtClean="0"/>
               <a:pPr/>
-              <a:t>5/31/11</a:t>
+              <a:t>6/1/11</a:t>
             </a:fld>
             <a:endParaRPr lang="en-US"/>
           </a:p>
@@ -2538,7 +2544,7 @@
             <a:fld id="{BB34CB12-3636-E74F-AC6D-0713EE8E1F4A}" type="datetimeFigureOut">
               <a:rPr lang="en-US" smtClean="0"/>
               <a:pPr/>
-              <a:t>5/31/11</a:t>
+              <a:t>6/1/11</a:t>
             </a:fld>
             <a:endParaRPr lang="en-US"/>
           </a:p>
@@ -2851,7 +2857,7 @@
             <a:fld id="{BB34CB12-3636-E74F-AC6D-0713EE8E1F4A}" type="datetimeFigureOut">
               <a:rPr lang="en-US" smtClean="0"/>
               <a:pPr/>
-              <a:t>5/31/11</a:t>
+              <a:t>6/1/11</a:t>
             </a:fld>
             <a:endParaRPr lang="en-US"/>
           </a:p>
@@ -3319,7 +3325,7 @@
             <a:fld id="{BB34CB12-3636-E74F-AC6D-0713EE8E1F4A}" type="datetimeFigureOut">
               <a:rPr lang="en-US" smtClean="0"/>
               <a:pPr/>
-              <a:t>5/31/11</a:t>
+              <a:t>6/1/11</a:t>
             </a:fld>
             <a:endParaRPr lang="en-US"/>
           </a:p>
@@ -3685,7 +3691,7 @@
             <a:fld id="{BB34CB12-3636-E74F-AC6D-0713EE8E1F4A}" type="datetimeFigureOut">
               <a:rPr lang="en-US" smtClean="0"/>
               <a:pPr/>
-              <a:t>5/31/11</a:t>
+              <a:t>6/1/11</a:t>
             </a:fld>
             <a:endParaRPr lang="en-US"/>
           </a:p>
@@ -3998,7 +4004,7 @@
             <a:fld id="{BB34CB12-3636-E74F-AC6D-0713EE8E1F4A}" type="datetimeFigureOut">
               <a:rPr lang="en-US" smtClean="0"/>
               <a:pPr/>
-              <a:t>5/31/11</a:t>
+              <a:t>6/1/11</a:t>
             </a:fld>
             <a:endParaRPr lang="en-US"/>
           </a:p>
@@ -4311,7 +4317,7 @@
             <a:fld id="{BB34CB12-3636-E74F-AC6D-0713EE8E1F4A}" type="datetimeFigureOut">
               <a:rPr lang="en-US" smtClean="0"/>
               <a:pPr/>
-              <a:t>5/31/11</a:t>
+              <a:t>6/1/11</a:t>
             </a:fld>
             <a:endParaRPr lang="en-US"/>
           </a:p>
@@ -4798,7 +4804,7 @@
             <a:fld id="{BB34CB12-3636-E74F-AC6D-0713EE8E1F4A}" type="datetimeFigureOut">
               <a:rPr lang="en-US" smtClean="0"/>
               <a:pPr/>
-              <a:t>5/31/11</a:t>
+              <a:t>6/1/11</a:t>
             </a:fld>
             <a:endParaRPr lang="en-US"/>
           </a:p>
@@ -5063,7 +5069,7 @@
             <a:fld id="{BB34CB12-3636-E74F-AC6D-0713EE8E1F4A}" type="datetimeFigureOut">
               <a:rPr lang="en-US" smtClean="0"/>
               <a:pPr/>
-              <a:t>5/31/11</a:t>
+              <a:t>6/1/11</a:t>
             </a:fld>
             <a:endParaRPr lang="en-US"/>
           </a:p>
@@ -5473,6 +5479,34 @@
           <a:bodyPr/>
           <a:lstStyle/>
           <a:p>
+            <a:r>
+              <a:rPr lang="en-US" dirty="0" smtClean="0"/>
+              <a:t>Carlos Quiroz, </a:t>
+            </a:r>
+            <a:r>
+              <a:rPr lang="en-US" dirty="0" err="1" smtClean="0"/>
+              <a:t>Nicol</a:t>
+            </a:r>
+            <a:r>
+              <a:rPr lang="en-US" dirty="0" err="1" smtClean="0"/>
+              <a:t>ás</a:t>
+            </a:r>
+            <a:r>
+              <a:rPr lang="en-US" dirty="0" smtClean="0"/>
+              <a:t> A. </a:t>
+            </a:r>
+            <a:r>
+              <a:rPr lang="en-US" dirty="0" err="1" smtClean="0"/>
+              <a:t>Barriga</a:t>
+            </a:r>
+            <a:r>
+              <a:rPr lang="en-US" dirty="0" smtClean="0"/>
+              <a:t>, Arturo </a:t>
+            </a:r>
+            <a:r>
+              <a:rPr lang="en-US" dirty="0" err="1" smtClean="0"/>
+              <a:t>Nuñez</a:t>
+            </a:r>
             <a:endParaRPr lang="en-US" dirty="0"/>
           </a:p>
         </p:txBody>
@@ -5518,12 +5552,8 @@
           <a:lstStyle/>
           <a:p>
             <a:r>
-              <a:rPr lang="en-US" dirty="0" err="1" smtClean="0"/>
-              <a:t>DataLabel</a:t>
-            </a:r>
-            <a:r>
-              <a:rPr lang="en-US" dirty="0" smtClean="0"/>
-              <a:t> Generation</a:t>
+              <a:rPr lang="en-US" dirty="0" smtClean="0"/>
+              <a:t>FITS Keywords Composition</a:t>
             </a:r>
             <a:endParaRPr lang="en-US" dirty="0"/>
           </a:p>
@@ -5531,7 +5561,7 @@
       </p:sp>
       <p:sp>
         <p:nvSpPr>
-          <p:cNvPr id="3" name="Content Placeholder 2"/>
+          <p:cNvPr id="4" name="Content Placeholder 3"/>
           <p:cNvSpPr>
             <a:spLocks noGrp="1"/>
           </p:cNvSpPr>
@@ -5544,63 +5574,46 @@
           <a:bodyPr/>
           <a:lstStyle/>
           <a:p>
-            <a:r>
-              <a:rPr lang="en-US" dirty="0" smtClean="0"/>
-              <a:t>Three alternatives</a:t>
-            </a:r>
-          </a:p>
-          <a:p>
-            <a:pPr lvl="1"/>
-            <a:r>
-              <a:rPr lang="en-US" dirty="0" smtClean="0"/>
-              <a:t>Keep current setup assuming DHS supports providing </a:t>
-            </a:r>
-            <a:r>
-              <a:rPr lang="en-US" dirty="0" err="1" smtClean="0"/>
-              <a:t>DataLabels</a:t>
-            </a:r>
-            <a:r>
-              <a:rPr lang="en-US" dirty="0" smtClean="0"/>
-              <a:t> that will not be populated</a:t>
-            </a:r>
-          </a:p>
-          <a:p>
-            <a:pPr lvl="1"/>
-            <a:r>
-              <a:rPr lang="en-US" dirty="0" smtClean="0"/>
-              <a:t>Extract common </a:t>
-            </a:r>
-            <a:r>
-              <a:rPr lang="en-US" dirty="0" err="1" smtClean="0"/>
-              <a:t>DataLabel</a:t>
-            </a:r>
-            <a:r>
-              <a:rPr lang="en-US" dirty="0" smtClean="0"/>
-              <a:t> Generator Component from DHS</a:t>
-            </a:r>
-          </a:p>
-          <a:p>
-            <a:pPr lvl="1"/>
-            <a:r>
-              <a:rPr lang="en-US" dirty="0" smtClean="0"/>
-              <a:t>Use independent </a:t>
-            </a:r>
-            <a:r>
-              <a:rPr lang="en-US" dirty="0" err="1" smtClean="0"/>
-              <a:t>DataLabel</a:t>
-            </a:r>
-            <a:r>
-              <a:rPr lang="en-US" dirty="0" smtClean="0"/>
-              <a:t> naming </a:t>
-            </a:r>
-            <a:r>
-              <a:rPr lang="en-US" dirty="0" err="1" smtClean="0"/>
-              <a:t>conventio</a:t>
-            </a:r>
             <a:endParaRPr lang="en-US" dirty="0"/>
           </a:p>
         </p:txBody>
       </p:sp>
+      <p:pic>
+        <p:nvPicPr>
+          <p:cNvPr id="5" name="Picture 4"/>
+          <p:cNvPicPr>
+            <a:picLocks noChangeAspect="1"/>
+          </p:cNvPicPr>
+          <p:nvPr/>
+        </p:nvPicPr>
+        <mc:AlternateContent>
+          <mc:Choice xmlns:ma="http://schemas.microsoft.com/office/mac/drawingml/2008/main" Requires="ma">
+            <p:blipFill>
+              <a:blip r:embed="rId2"/>
+              <a:stretch>
+                <a:fillRect/>
+              </a:stretch>
+            </p:blipFill>
+          </mc:Choice>
+          <mc:Fallback>
+            <p:blipFill>
+              <a:blip r:embed="rId3"/>
+              <a:stretch>
+                <a:fillRect/>
+              </a:stretch>
+            </p:blipFill>
+          </mc:Fallback>
+        </mc:AlternateContent>
+        <p:spPr>
+          <a:xfrm>
+            <a:off x="315782" y="1597863"/>
+            <a:ext cx="8570227" cy="4662894"/>
+          </a:xfrm>
+          <a:prstGeom prst="rect">
+            <a:avLst/>
+          </a:prstGeom>
+        </p:spPr>
+      </p:pic>
     </p:spTree>
   </p:cSld>
   <p:clrMapOvr>
@@ -5610,6 +5623,495 @@
 </file>
 
 <file path=ppt/slides/slide11.xml><?xml version="1.0" encoding="utf-8"?>
+<p:sld xmlns:a="http://schemas.openxmlformats.org/drawingml/2006/main" xmlns:r="http://schemas.openxmlformats.org/officeDocument/2006/relationships" xmlns:mc="http://schemas.openxmlformats.org/markup-compatibility/2006" xmlns:mv="urn:schemas-microsoft-com:mac:vml" xmlns:p="http://schemas.openxmlformats.org/presentationml/2006/main" mc:Ignorable="mv" mc:PreserveAttributes="mv:*">
+  <p:cSld>
+    <p:spTree>
+      <p:nvGrpSpPr>
+        <p:cNvPr id="1" name=""/>
+        <p:cNvGrpSpPr/>
+        <p:nvPr/>
+      </p:nvGrpSpPr>
+      <p:grpSpPr>
+        <a:xfrm>
+          <a:off x="0" y="0"/>
+          <a:ext cx="0" cy="0"/>
+          <a:chOff x="0" y="0"/>
+          <a:chExt cx="0" cy="0"/>
+        </a:xfrm>
+      </p:grpSpPr>
+      <p:sp>
+        <p:nvSpPr>
+          <p:cNvPr id="2" name="Title 1"/>
+          <p:cNvSpPr>
+            <a:spLocks noGrp="1"/>
+          </p:cNvSpPr>
+          <p:nvPr>
+            <p:ph type="title"/>
+          </p:nvPr>
+        </p:nvSpPr>
+        <p:spPr/>
+        <p:txBody>
+          <a:bodyPr/>
+          <a:lstStyle/>
+          <a:p>
+            <a:r>
+              <a:rPr lang="en-US" dirty="0" smtClean="0"/>
+              <a:t>FITS Keywords Composition</a:t>
+            </a:r>
+            <a:endParaRPr lang="en-US" dirty="0"/>
+          </a:p>
+        </p:txBody>
+      </p:sp>
+      <p:sp>
+        <p:nvSpPr>
+          <p:cNvPr id="3" name="Content Placeholder 2"/>
+          <p:cNvSpPr>
+            <a:spLocks noGrp="1"/>
+          </p:cNvSpPr>
+          <p:nvPr>
+            <p:ph idx="1"/>
+          </p:nvPr>
+        </p:nvSpPr>
+        <p:spPr/>
+        <p:txBody>
+          <a:bodyPr/>
+          <a:lstStyle/>
+          <a:p>
+            <a:r>
+              <a:rPr lang="en-US" dirty="0" smtClean="0"/>
+              <a:t>GDS listens to Instrument generated Observation </a:t>
+            </a:r>
+            <a:r>
+              <a:rPr lang="en-US" dirty="0" smtClean="0"/>
+              <a:t>Events</a:t>
+            </a:r>
+            <a:endParaRPr lang="en-US" dirty="0" smtClean="0"/>
+          </a:p>
+          <a:p>
+            <a:r>
+              <a:rPr lang="en-US" dirty="0" smtClean="0"/>
+              <a:t>GDS collects FITS keywords</a:t>
+            </a:r>
+          </a:p>
+          <a:p>
+            <a:r>
+              <a:rPr lang="en-US" dirty="0" smtClean="0"/>
+              <a:t>It can also accept FITS keywords published by other systems like the </a:t>
+            </a:r>
+            <a:r>
+              <a:rPr lang="en-US" dirty="0" err="1" smtClean="0"/>
+              <a:t>Seqexec</a:t>
+            </a:r>
+            <a:r>
+              <a:rPr lang="en-US" dirty="0" smtClean="0"/>
+              <a:t> as explained earlier</a:t>
+            </a:r>
+            <a:endParaRPr lang="en-US" dirty="0" smtClean="0"/>
+          </a:p>
+        </p:txBody>
+      </p:sp>
+    </p:spTree>
+  </p:cSld>
+  <p:clrMapOvr>
+    <a:masterClrMapping/>
+  </p:clrMapOvr>
+</p:sld>
+</file>
+
+<file path=ppt/slides/slide12.xml><?xml version="1.0" encoding="utf-8"?>
+<p:sld xmlns:a="http://schemas.openxmlformats.org/drawingml/2006/main" xmlns:r="http://schemas.openxmlformats.org/officeDocument/2006/relationships" xmlns:mc="http://schemas.openxmlformats.org/markup-compatibility/2006" xmlns:mv="urn:schemas-microsoft-com:mac:vml" xmlns:p="http://schemas.openxmlformats.org/presentationml/2006/main" mc:Ignorable="mv" mc:PreserveAttributes="mv:*">
+  <p:cSld>
+    <p:spTree>
+      <p:nvGrpSpPr>
+        <p:cNvPr id="1" name=""/>
+        <p:cNvGrpSpPr/>
+        <p:nvPr/>
+      </p:nvGrpSpPr>
+      <p:grpSpPr>
+        <a:xfrm>
+          <a:off x="0" y="0"/>
+          <a:ext cx="0" cy="0"/>
+          <a:chOff x="0" y="0"/>
+          <a:chExt cx="0" cy="0"/>
+        </a:xfrm>
+      </p:grpSpPr>
+      <p:sp>
+        <p:nvSpPr>
+          <p:cNvPr id="2" name="Title 1"/>
+          <p:cNvSpPr>
+            <a:spLocks noGrp="1"/>
+          </p:cNvSpPr>
+          <p:nvPr>
+            <p:ph type="title"/>
+          </p:nvPr>
+        </p:nvSpPr>
+        <p:spPr/>
+        <p:txBody>
+          <a:bodyPr/>
+          <a:lstStyle/>
+          <a:p>
+            <a:r>
+              <a:rPr lang="en-US" dirty="0" smtClean="0"/>
+              <a:t>Completion of FITS Files</a:t>
+            </a:r>
+            <a:endParaRPr lang="en-US" dirty="0"/>
+          </a:p>
+        </p:txBody>
+      </p:sp>
+      <p:sp>
+        <p:nvSpPr>
+          <p:cNvPr id="4" name="Content Placeholder 3"/>
+          <p:cNvSpPr>
+            <a:spLocks noGrp="1"/>
+          </p:cNvSpPr>
+          <p:nvPr>
+            <p:ph idx="1"/>
+          </p:nvPr>
+        </p:nvSpPr>
+        <p:spPr/>
+        <p:txBody>
+          <a:bodyPr/>
+          <a:lstStyle/>
+          <a:p>
+            <a:endParaRPr lang="en-US"/>
+          </a:p>
+        </p:txBody>
+      </p:sp>
+      <p:pic>
+        <p:nvPicPr>
+          <p:cNvPr id="6" name="Picture 5"/>
+          <p:cNvPicPr>
+            <a:picLocks noChangeAspect="1"/>
+          </p:cNvPicPr>
+          <p:nvPr/>
+        </p:nvPicPr>
+        <mc:AlternateContent>
+          <mc:Choice xmlns:ma="http://schemas.microsoft.com/office/mac/drawingml/2008/main" Requires="ma">
+            <p:blipFill>
+              <a:blip r:embed="rId2"/>
+              <a:stretch>
+                <a:fillRect/>
+              </a:stretch>
+            </p:blipFill>
+          </mc:Choice>
+          <mc:Fallback>
+            <p:blipFill>
+              <a:blip r:embed="rId3"/>
+              <a:stretch>
+                <a:fillRect/>
+              </a:stretch>
+            </p:blipFill>
+          </mc:Fallback>
+        </mc:AlternateContent>
+        <p:spPr>
+          <a:xfrm>
+            <a:off x="388209" y="1698828"/>
+            <a:ext cx="8460360" cy="4603118"/>
+          </a:xfrm>
+          <a:prstGeom prst="rect">
+            <a:avLst/>
+          </a:prstGeom>
+        </p:spPr>
+      </p:pic>
+    </p:spTree>
+  </p:cSld>
+  <p:clrMapOvr>
+    <a:masterClrMapping/>
+  </p:clrMapOvr>
+</p:sld>
+</file>
+
+<file path=ppt/slides/slide13.xml><?xml version="1.0" encoding="utf-8"?>
+<p:sld xmlns:a="http://schemas.openxmlformats.org/drawingml/2006/main" xmlns:r="http://schemas.openxmlformats.org/officeDocument/2006/relationships" xmlns:mc="http://schemas.openxmlformats.org/markup-compatibility/2006" xmlns:mv="urn:schemas-microsoft-com:mac:vml" xmlns:p="http://schemas.openxmlformats.org/presentationml/2006/main" mc:Ignorable="mv" mc:PreserveAttributes="mv:*">
+  <p:cSld>
+    <p:spTree>
+      <p:nvGrpSpPr>
+        <p:cNvPr id="1" name=""/>
+        <p:cNvGrpSpPr/>
+        <p:nvPr/>
+      </p:nvGrpSpPr>
+      <p:grpSpPr>
+        <a:xfrm>
+          <a:off x="0" y="0"/>
+          <a:ext cx="0" cy="0"/>
+          <a:chOff x="0" y="0"/>
+          <a:chExt cx="0" cy="0"/>
+        </a:xfrm>
+      </p:grpSpPr>
+      <p:sp>
+        <p:nvSpPr>
+          <p:cNvPr id="2" name="Title 1"/>
+          <p:cNvSpPr>
+            <a:spLocks noGrp="1"/>
+          </p:cNvSpPr>
+          <p:nvPr>
+            <p:ph type="title"/>
+          </p:nvPr>
+        </p:nvSpPr>
+        <p:spPr/>
+        <p:txBody>
+          <a:bodyPr/>
+          <a:lstStyle/>
+          <a:p>
+            <a:r>
+              <a:rPr lang="en-US" dirty="0" smtClean="0"/>
+              <a:t>Completion of FITS Files</a:t>
+            </a:r>
+            <a:endParaRPr lang="en-US" dirty="0"/>
+          </a:p>
+        </p:txBody>
+      </p:sp>
+      <p:sp>
+        <p:nvSpPr>
+          <p:cNvPr id="3" name="Content Placeholder 2"/>
+          <p:cNvSpPr>
+            <a:spLocks noGrp="1"/>
+          </p:cNvSpPr>
+          <p:nvPr>
+            <p:ph idx="1"/>
+          </p:nvPr>
+        </p:nvSpPr>
+        <p:spPr/>
+        <p:txBody>
+          <a:bodyPr/>
+          <a:lstStyle/>
+          <a:p>
+            <a:r>
+              <a:rPr lang="en-US" dirty="0" smtClean="0"/>
+              <a:t>Instrument writes FITS to</a:t>
+            </a:r>
+            <a:r>
+              <a:rPr lang="en-US" dirty="0" smtClean="0"/>
+              <a:t> GDSN</a:t>
+            </a:r>
+          </a:p>
+          <a:p>
+            <a:r>
+              <a:rPr lang="en-US" dirty="0" smtClean="0"/>
+              <a:t>GDS</a:t>
+            </a:r>
+            <a:r>
+              <a:rPr lang="en-US" dirty="0" smtClean="0"/>
+              <a:t> completes the </a:t>
+            </a:r>
+            <a:r>
+              <a:rPr lang="en-US" dirty="0" smtClean="0"/>
+              <a:t>full set of FITS keywords to</a:t>
+            </a:r>
+            <a:r>
+              <a:rPr lang="en-US" dirty="0" smtClean="0"/>
+              <a:t> the FITS file</a:t>
+            </a:r>
+          </a:p>
+          <a:p>
+            <a:r>
+              <a:rPr lang="en-US" dirty="0" smtClean="0"/>
+              <a:t>Original files are preserved</a:t>
+            </a:r>
+            <a:endParaRPr lang="en-US" dirty="0"/>
+          </a:p>
+        </p:txBody>
+      </p:sp>
+    </p:spTree>
+  </p:cSld>
+  <p:clrMapOvr>
+    <a:masterClrMapping/>
+  </p:clrMapOvr>
+</p:sld>
+</file>
+
+<file path=ppt/slides/slide14.xml><?xml version="1.0" encoding="utf-8"?>
+<p:sld xmlns:a="http://schemas.openxmlformats.org/drawingml/2006/main" xmlns:r="http://schemas.openxmlformats.org/officeDocument/2006/relationships" xmlns:mc="http://schemas.openxmlformats.org/markup-compatibility/2006" xmlns:mv="urn:schemas-microsoft-com:mac:vml" xmlns:p="http://schemas.openxmlformats.org/presentationml/2006/main" mc:Ignorable="mv" mc:PreserveAttributes="mv:*">
+  <p:cSld>
+    <p:spTree>
+      <p:nvGrpSpPr>
+        <p:cNvPr id="1" name=""/>
+        <p:cNvGrpSpPr/>
+        <p:nvPr/>
+      </p:nvGrpSpPr>
+      <p:grpSpPr>
+        <a:xfrm>
+          <a:off x="0" y="0"/>
+          <a:ext cx="0" cy="0"/>
+          <a:chOff x="0" y="0"/>
+          <a:chExt cx="0" cy="0"/>
+        </a:xfrm>
+      </p:grpSpPr>
+      <p:sp>
+        <p:nvSpPr>
+          <p:cNvPr id="4" name="Title 3"/>
+          <p:cNvSpPr>
+            <a:spLocks noGrp="1"/>
+          </p:cNvSpPr>
+          <p:nvPr>
+            <p:ph type="title"/>
+          </p:nvPr>
+        </p:nvSpPr>
+        <p:spPr/>
+        <p:txBody>
+          <a:bodyPr/>
+          <a:lstStyle/>
+          <a:p>
+            <a:r>
+              <a:rPr lang="en-US" dirty="0" smtClean="0"/>
+              <a:t>Implementation Details</a:t>
+            </a:r>
+            <a:endParaRPr lang="en-US" dirty="0"/>
+          </a:p>
+        </p:txBody>
+      </p:sp>
+      <p:sp>
+        <p:nvSpPr>
+          <p:cNvPr id="5" name="Text Placeholder 4"/>
+          <p:cNvSpPr>
+            <a:spLocks noGrp="1"/>
+          </p:cNvSpPr>
+          <p:nvPr>
+            <p:ph type="body" idx="1"/>
+          </p:nvPr>
+        </p:nvSpPr>
+        <p:spPr/>
+        <p:txBody>
+          <a:bodyPr/>
+          <a:lstStyle/>
+          <a:p>
+            <a:endParaRPr lang="en-US"/>
+          </a:p>
+        </p:txBody>
+      </p:sp>
+    </p:spTree>
+  </p:cSld>
+  <p:clrMapOvr>
+    <a:masterClrMapping/>
+  </p:clrMapOvr>
+</p:sld>
+</file>
+
+<file path=ppt/slides/slide15.xml><?xml version="1.0" encoding="utf-8"?>
+<p:sld xmlns:a="http://schemas.openxmlformats.org/drawingml/2006/main" xmlns:r="http://schemas.openxmlformats.org/officeDocument/2006/relationships" xmlns:mc="http://schemas.openxmlformats.org/markup-compatibility/2006" xmlns:mv="urn:schemas-microsoft-com:mac:vml" xmlns:p="http://schemas.openxmlformats.org/presentationml/2006/main" mc:Ignorable="mv" mc:PreserveAttributes="mv:*">
+  <p:cSld>
+    <p:spTree>
+      <p:nvGrpSpPr>
+        <p:cNvPr id="1" name=""/>
+        <p:cNvGrpSpPr/>
+        <p:nvPr/>
+      </p:nvGrpSpPr>
+      <p:grpSpPr>
+        <a:xfrm>
+          <a:off x="0" y="0"/>
+          <a:ext cx="0" cy="0"/>
+          <a:chOff x="0" y="0"/>
+          <a:chExt cx="0" cy="0"/>
+        </a:xfrm>
+      </p:grpSpPr>
+      <p:sp>
+        <p:nvSpPr>
+          <p:cNvPr id="2" name="Title 1"/>
+          <p:cNvSpPr>
+            <a:spLocks noGrp="1"/>
+          </p:cNvSpPr>
+          <p:nvPr>
+            <p:ph type="title"/>
+          </p:nvPr>
+        </p:nvSpPr>
+        <p:spPr/>
+        <p:txBody>
+          <a:bodyPr/>
+          <a:lstStyle/>
+          <a:p>
+            <a:r>
+              <a:rPr lang="en-US" dirty="0" err="1" smtClean="0"/>
+              <a:t>DataLabel</a:t>
+            </a:r>
+            <a:r>
+              <a:rPr lang="en-US" dirty="0" smtClean="0"/>
+              <a:t> Generation</a:t>
+            </a:r>
+            <a:endParaRPr lang="en-US" dirty="0"/>
+          </a:p>
+        </p:txBody>
+      </p:sp>
+      <p:sp>
+        <p:nvSpPr>
+          <p:cNvPr id="3" name="Content Placeholder 2"/>
+          <p:cNvSpPr>
+            <a:spLocks noGrp="1"/>
+          </p:cNvSpPr>
+          <p:nvPr>
+            <p:ph idx="1"/>
+          </p:nvPr>
+        </p:nvSpPr>
+        <p:spPr/>
+        <p:txBody>
+          <a:bodyPr/>
+          <a:lstStyle/>
+          <a:p>
+            <a:r>
+              <a:rPr lang="en-US" dirty="0" smtClean="0"/>
+              <a:t>Three alternatives</a:t>
+            </a:r>
+          </a:p>
+          <a:p>
+            <a:pPr lvl="1"/>
+            <a:r>
+              <a:rPr lang="en-US" dirty="0" smtClean="0"/>
+              <a:t>Keep current setup assuming DHS supports providing </a:t>
+            </a:r>
+            <a:r>
+              <a:rPr lang="en-US" dirty="0" err="1" smtClean="0"/>
+              <a:t>DataLabels</a:t>
+            </a:r>
+            <a:r>
+              <a:rPr lang="en-US" dirty="0" smtClean="0"/>
+              <a:t> that will not be populated</a:t>
+            </a:r>
+          </a:p>
+          <a:p>
+            <a:pPr lvl="1"/>
+            <a:r>
+              <a:rPr lang="en-US" dirty="0" smtClean="0"/>
+              <a:t>Extract common </a:t>
+            </a:r>
+            <a:r>
+              <a:rPr lang="en-US" dirty="0" err="1" smtClean="0"/>
+              <a:t>DataLabel</a:t>
+            </a:r>
+            <a:r>
+              <a:rPr lang="en-US" dirty="0" smtClean="0"/>
+              <a:t> Generator Component from DHS</a:t>
+            </a:r>
+          </a:p>
+          <a:p>
+            <a:pPr lvl="1"/>
+            <a:r>
+              <a:rPr lang="en-US" dirty="0" smtClean="0"/>
+              <a:t>Use independent </a:t>
+            </a:r>
+            <a:r>
+              <a:rPr lang="en-US" dirty="0" err="1" smtClean="0"/>
+              <a:t>DataLabel</a:t>
+            </a:r>
+            <a:r>
+              <a:rPr lang="en-US" dirty="0" smtClean="0"/>
+              <a:t> naming </a:t>
+            </a:r>
+            <a:r>
+              <a:rPr lang="en-US" dirty="0" err="1" smtClean="0"/>
+              <a:t>conventio</a:t>
+            </a:r>
+            <a:endParaRPr lang="en-US" dirty="0"/>
+          </a:p>
+        </p:txBody>
+      </p:sp>
+    </p:spTree>
+  </p:cSld>
+  <p:clrMapOvr>
+    <a:masterClrMapping/>
+  </p:clrMapOvr>
+</p:sld>
+</file>
+
+<file path=ppt/slides/slide16.xml><?xml version="1.0" encoding="utf-8"?>
 <p:sld xmlns:a="http://schemas.openxmlformats.org/drawingml/2006/main" xmlns:r="http://schemas.openxmlformats.org/officeDocument/2006/relationships" xmlns:mc="http://schemas.openxmlformats.org/markup-compatibility/2006" xmlns:mv="urn:schemas-microsoft-com:mac:vml" xmlns:p="http://schemas.openxmlformats.org/presentationml/2006/main" mc:Ignorable="mv" mc:PreserveAttributes="mv:*">
   <p:cSld>
     <p:spTree>
@@ -5708,7 +6210,7 @@
 </p:sld>
 </file>
 
-<file path=ppt/slides/slide12.xml><?xml version="1.0" encoding="utf-8"?>
+<file path=ppt/slides/slide17.xml><?xml version="1.0" encoding="utf-8"?>
 <p:sld xmlns:a="http://schemas.openxmlformats.org/drawingml/2006/main" xmlns:r="http://schemas.openxmlformats.org/officeDocument/2006/relationships" xmlns:mc="http://schemas.openxmlformats.org/markup-compatibility/2006" xmlns:mv="urn:schemas-microsoft-com:mac:vml" xmlns:p="http://schemas.openxmlformats.org/presentationml/2006/main" mc:Ignorable="mv" mc:PreserveAttributes="mv:*">
   <p:cSld>
     <p:spTree>
@@ -5807,7 +6309,7 @@
 </p:sld>
 </file>
 
-<file path=ppt/slides/slide13.xml><?xml version="1.0" encoding="utf-8"?>
+<file path=ppt/slides/slide18.xml><?xml version="1.0" encoding="utf-8"?>
 <p:sld xmlns:a="http://schemas.openxmlformats.org/drawingml/2006/main" xmlns:r="http://schemas.openxmlformats.org/officeDocument/2006/relationships" xmlns:mc="http://schemas.openxmlformats.org/markup-compatibility/2006" xmlns:mv="urn:schemas-microsoft-com:mac:vml" xmlns:p="http://schemas.openxmlformats.org/presentationml/2006/main" mc:Ignorable="mv" mc:PreserveAttributes="mv:*">
   <p:cSld>
     <p:spTree>
@@ -5906,7 +6408,7 @@
 </p:sld>
 </file>
 
-<file path=ppt/slides/slide14.xml><?xml version="1.0" encoding="utf-8"?>
+<file path=ppt/slides/slide19.xml><?xml version="1.0" encoding="utf-8"?>
 <p:sld xmlns:a="http://schemas.openxmlformats.org/drawingml/2006/main" xmlns:r="http://schemas.openxmlformats.org/officeDocument/2006/relationships" xmlns:mc="http://schemas.openxmlformats.org/markup-compatibility/2006" xmlns:mv="urn:schemas-microsoft-com:mac:vml" xmlns:p="http://schemas.openxmlformats.org/presentationml/2006/main" mc:Ignorable="mv" mc:PreserveAttributes="mv:*">
   <p:cSld>
     <p:spTree>
@@ -5997,7 +6499,7 @@
 </p:sld>
 </file>
 
-<file path=ppt/slides/slide15.xml><?xml version="1.0" encoding="utf-8"?>
+<file path=ppt/slides/slide2.xml><?xml version="1.0" encoding="utf-8"?>
 <p:sld xmlns:a="http://schemas.openxmlformats.org/drawingml/2006/main" xmlns:r="http://schemas.openxmlformats.org/officeDocument/2006/relationships" xmlns:mc="http://schemas.openxmlformats.org/markup-compatibility/2006" xmlns:mv="urn:schemas-microsoft-com:mac:vml" xmlns:p="http://schemas.openxmlformats.org/presentationml/2006/main" mc:Ignorable="mv" mc:PreserveAttributes="mv:*">
   <p:cSld>
     <p:spTree>
@@ -6031,19 +6533,225 @@
           <a:p>
             <a:r>
               <a:rPr lang="en-US" dirty="0" smtClean="0"/>
-              <a:t>Keyword configuration in</a:t>
-            </a:r>
-            <a:r>
-              <a:rPr lang="en-US" dirty="0" smtClean="0"/>
-              <a:t> read-</a:t>
-            </a:r>
-            <a:r>
-              <a:rPr lang="en-US" dirty="0" smtClean="0"/>
-              <a:t>o</a:t>
-            </a:r>
-            <a:r>
-              <a:rPr lang="en-US" dirty="0" smtClean="0"/>
-              <a:t>nly mode</a:t>
+              <a:t>GDS Motivation</a:t>
+            </a:r>
+            <a:endParaRPr lang="en-US" dirty="0"/>
+          </a:p>
+        </p:txBody>
+      </p:sp>
+      <p:sp>
+        <p:nvSpPr>
+          <p:cNvPr id="3" name="Content Placeholder 2"/>
+          <p:cNvSpPr>
+            <a:spLocks noGrp="1"/>
+          </p:cNvSpPr>
+          <p:nvPr>
+            <p:ph idx="1"/>
+          </p:nvPr>
+        </p:nvSpPr>
+        <p:spPr/>
+        <p:txBody>
+          <a:bodyPr/>
+          <a:lstStyle/>
+          <a:p>
+            <a:r>
+              <a:rPr lang="en-US" dirty="0" smtClean="0"/>
+              <a:t>Required for GIAPI</a:t>
+            </a:r>
+            <a:r>
+              <a:rPr lang="en-US" dirty="0" smtClean="0"/>
+              <a:t>-based</a:t>
+            </a:r>
+            <a:r>
+              <a:rPr lang="en-US" dirty="0" smtClean="0"/>
+              <a:t> instruments that are not connected to the DHS</a:t>
+            </a:r>
+          </a:p>
+          <a:p>
+            <a:r>
+              <a:rPr lang="en-US" dirty="0" smtClean="0"/>
+              <a:t>Compatibility with GIAPI</a:t>
+            </a:r>
+            <a:endParaRPr lang="en-US" dirty="0" smtClean="0"/>
+          </a:p>
+          <a:p>
+            <a:pPr lvl="0"/>
+            <a:r>
+              <a:rPr lang="en-US" dirty="0" smtClean="0"/>
+              <a:t>Reduce the dependency on DHS complexity</a:t>
+            </a:r>
+          </a:p>
+          <a:p>
+            <a:pPr lvl="0"/>
+            <a:r>
+              <a:rPr lang="en-US" dirty="0" smtClean="0"/>
+              <a:t>DHS </a:t>
+            </a:r>
+            <a:r>
+              <a:rPr lang="en-US" dirty="0" smtClean="0"/>
+              <a:t>is d</a:t>
+            </a:r>
+            <a:r>
+              <a:rPr lang="en-US" dirty="0" smtClean="0"/>
+              <a:t>ifficult </a:t>
+            </a:r>
+            <a:r>
+              <a:rPr lang="en-US" dirty="0" smtClean="0"/>
+              <a:t>to maintain and </a:t>
+            </a:r>
+            <a:r>
+              <a:rPr lang="en-US" dirty="0" smtClean="0"/>
+              <a:t>modify</a:t>
+            </a:r>
+          </a:p>
+          <a:p>
+            <a:pPr lvl="0"/>
+            <a:r>
+              <a:rPr lang="en-US" dirty="0" smtClean="0"/>
+              <a:t>GDS is decoupled from the instrument</a:t>
+            </a:r>
+          </a:p>
+          <a:p>
+            <a:pPr lvl="0"/>
+            <a:r>
+              <a:rPr lang="en-US" dirty="0" smtClean="0"/>
+              <a:t>Simplified operation?</a:t>
+            </a:r>
+            <a:endParaRPr lang="en-US" dirty="0" smtClean="0"/>
+          </a:p>
+        </p:txBody>
+      </p:sp>
+    </p:spTree>
+  </p:cSld>
+  <p:clrMapOvr>
+    <a:masterClrMapping/>
+  </p:clrMapOvr>
+</p:sld>
+</file>
+
+<file path=ppt/slides/slide20.xml><?xml version="1.0" encoding="utf-8"?>
+<p:sld xmlns:a="http://schemas.openxmlformats.org/drawingml/2006/main" xmlns:r="http://schemas.openxmlformats.org/officeDocument/2006/relationships" xmlns:mc="http://schemas.openxmlformats.org/markup-compatibility/2006" xmlns:mv="urn:schemas-microsoft-com:mac:vml" xmlns:p="http://schemas.openxmlformats.org/presentationml/2006/main" mc:Ignorable="mv" mc:PreserveAttributes="mv:*">
+  <p:cSld>
+    <p:spTree>
+      <p:nvGrpSpPr>
+        <p:cNvPr id="1" name=""/>
+        <p:cNvGrpSpPr/>
+        <p:nvPr/>
+      </p:nvGrpSpPr>
+      <p:grpSpPr>
+        <a:xfrm>
+          <a:off x="0" y="0"/>
+          <a:ext cx="0" cy="0"/>
+          <a:chOff x="0" y="0"/>
+          <a:chExt cx="0" cy="0"/>
+        </a:xfrm>
+      </p:grpSpPr>
+      <p:sp>
+        <p:nvSpPr>
+          <p:cNvPr id="2" name="Title 1"/>
+          <p:cNvSpPr>
+            <a:spLocks noGrp="1"/>
+          </p:cNvSpPr>
+          <p:nvPr>
+            <p:ph type="title"/>
+          </p:nvPr>
+        </p:nvSpPr>
+        <p:spPr/>
+        <p:txBody>
+          <a:bodyPr/>
+          <a:lstStyle/>
+          <a:p>
+            <a:r>
+              <a:rPr lang="en-US" dirty="0" smtClean="0"/>
+              <a:t>User Interface</a:t>
+            </a:r>
+            <a:endParaRPr lang="en-US" dirty="0"/>
+          </a:p>
+        </p:txBody>
+      </p:sp>
+      <p:sp>
+        <p:nvSpPr>
+          <p:cNvPr id="3" name="Content Placeholder 2"/>
+          <p:cNvSpPr>
+            <a:spLocks noGrp="1"/>
+          </p:cNvSpPr>
+          <p:nvPr>
+            <p:ph idx="1"/>
+          </p:nvPr>
+        </p:nvSpPr>
+        <p:spPr/>
+        <p:txBody>
+          <a:bodyPr/>
+          <a:lstStyle/>
+          <a:p>
+            <a:r>
+              <a:rPr lang="en-US" dirty="0" smtClean="0"/>
+              <a:t>Observations are started form </a:t>
+            </a:r>
+            <a:r>
+              <a:rPr lang="en-US" dirty="0" err="1" smtClean="0"/>
+              <a:t>Seqexec</a:t>
+            </a:r>
+            <a:endParaRPr lang="en-US" dirty="0" smtClean="0"/>
+          </a:p>
+          <a:p>
+            <a:r>
+              <a:rPr lang="en-US" dirty="0" smtClean="0"/>
+              <a:t>Web-based interface for configuration and status check</a:t>
+            </a:r>
+          </a:p>
+          <a:p>
+            <a:r>
+              <a:rPr lang="en-US" dirty="0" smtClean="0"/>
+              <a:t>Heartbeat and status published for other systems</a:t>
+            </a:r>
+            <a:endParaRPr lang="en-US" dirty="0"/>
+          </a:p>
+        </p:txBody>
+      </p:sp>
+    </p:spTree>
+  </p:cSld>
+  <p:clrMapOvr>
+    <a:masterClrMapping/>
+  </p:clrMapOvr>
+</p:sld>
+</file>
+
+<file path=ppt/slides/slide21.xml><?xml version="1.0" encoding="utf-8"?>
+<p:sld xmlns:a="http://schemas.openxmlformats.org/drawingml/2006/main" xmlns:r="http://schemas.openxmlformats.org/officeDocument/2006/relationships" xmlns:mc="http://schemas.openxmlformats.org/markup-compatibility/2006" xmlns:mv="urn:schemas-microsoft-com:mac:vml" xmlns:p="http://schemas.openxmlformats.org/presentationml/2006/main" mc:Ignorable="mv" mc:PreserveAttributes="mv:*">
+  <p:cSld>
+    <p:spTree>
+      <p:nvGrpSpPr>
+        <p:cNvPr id="1" name=""/>
+        <p:cNvGrpSpPr/>
+        <p:nvPr/>
+      </p:nvGrpSpPr>
+      <p:grpSpPr>
+        <a:xfrm>
+          <a:off x="0" y="0"/>
+          <a:ext cx="0" cy="0"/>
+          <a:chOff x="0" y="0"/>
+          <a:chExt cx="0" cy="0"/>
+        </a:xfrm>
+      </p:grpSpPr>
+      <p:sp>
+        <p:nvSpPr>
+          <p:cNvPr id="2" name="Title 1"/>
+          <p:cNvSpPr>
+            <a:spLocks noGrp="1"/>
+          </p:cNvSpPr>
+          <p:nvPr>
+            <p:ph type="title"/>
+          </p:nvPr>
+        </p:nvSpPr>
+        <p:spPr/>
+        <p:txBody>
+          <a:bodyPr/>
+          <a:lstStyle/>
+          <a:p>
+            <a:r>
+              <a:rPr lang="en-US" dirty="0" smtClean="0"/>
+              <a:t>Keyword configuration in read-only mode</a:t>
             </a:r>
             <a:endParaRPr lang="en-US" dirty="0"/>
           </a:p>
@@ -6080,6 +6788,10 @@
           </mc:Fallback>
         </mc:AlternateContent>
         <p:spPr bwMode="auto">
+          <a:xfrm>
+            <a:off x="779463" y="1828799"/>
+            <a:ext cx="7732082" cy="4352013"/>
+          </a:xfrm>
           <a:prstGeom prst="rect">
             <a:avLst/>
           </a:prstGeom>
@@ -6100,7 +6812,7 @@
 </p:sld>
 </file>
 
-<file path=ppt/slides/slide16.xml><?xml version="1.0" encoding="utf-8"?>
+<file path=ppt/slides/slide22.xml><?xml version="1.0" encoding="utf-8"?>
 <p:sld xmlns:a="http://schemas.openxmlformats.org/drawingml/2006/main" xmlns:r="http://schemas.openxmlformats.org/officeDocument/2006/relationships" xmlns:mc="http://schemas.openxmlformats.org/markup-compatibility/2006" xmlns:mv="urn:schemas-microsoft-com:mac:vml" xmlns:p="http://schemas.openxmlformats.org/presentationml/2006/main" mc:Ignorable="mv" mc:PreserveAttributes="mv:*">
   <p:cSld>
     <p:spTree>
@@ -6195,7 +6907,7 @@
 </p:sld>
 </file>
 
-<file path=ppt/slides/slide17.xml><?xml version="1.0" encoding="utf-8"?>
+<file path=ppt/slides/slide23.xml><?xml version="1.0" encoding="utf-8"?>
 <p:sld xmlns:a="http://schemas.openxmlformats.org/drawingml/2006/main" xmlns:r="http://schemas.openxmlformats.org/officeDocument/2006/relationships" xmlns:mc="http://schemas.openxmlformats.org/markup-compatibility/2006" xmlns:mv="urn:schemas-microsoft-com:mac:vml" xmlns:p="http://schemas.openxmlformats.org/presentationml/2006/main" mc:Ignorable="mv" mc:PreserveAttributes="mv:*">
   <p:cSld>
     <p:spTree>
@@ -6290,7 +7002,7 @@
 </p:sld>
 </file>
 
-<file path=ppt/slides/slide18.xml><?xml version="1.0" encoding="utf-8"?>
+<file path=ppt/slides/slide24.xml><?xml version="1.0" encoding="utf-8"?>
 <p:sld xmlns:a="http://schemas.openxmlformats.org/drawingml/2006/main" xmlns:r="http://schemas.openxmlformats.org/officeDocument/2006/relationships" xmlns:mc="http://schemas.openxmlformats.org/markup-compatibility/2006" xmlns:mv="urn:schemas-microsoft-com:mac:vml" xmlns:p="http://schemas.openxmlformats.org/presentationml/2006/main" mc:Ignorable="mv" mc:PreserveAttributes="mv:*">
   <p:cSld>
     <p:spTree>
@@ -6385,7 +7097,7 @@
 </p:sld>
 </file>
 
-<file path=ppt/slides/slide19.xml><?xml version="1.0" encoding="utf-8"?>
+<file path=ppt/slides/slide25.xml><?xml version="1.0" encoding="utf-8"?>
 <p:sld xmlns:a="http://schemas.openxmlformats.org/drawingml/2006/main" xmlns:r="http://schemas.openxmlformats.org/officeDocument/2006/relationships" xmlns:mc="http://schemas.openxmlformats.org/markup-compatibility/2006" xmlns:mv="urn:schemas-microsoft-com:mac:vml" xmlns:p="http://schemas.openxmlformats.org/presentationml/2006/main" mc:Ignorable="mv" mc:PreserveAttributes="mv:*">
   <p:cSld>
     <p:spTree>
@@ -6417,7 +7129,11 @@
           <a:bodyPr/>
           <a:lstStyle/>
           <a:p>
-            <a:endParaRPr lang="en-US"/>
+            <a:r>
+              <a:rPr lang="en-US" dirty="0" smtClean="0"/>
+              <a:t>Operational Aspects</a:t>
+            </a:r>
+            <a:endParaRPr lang="en-US" dirty="0"/>
           </a:p>
         </p:txBody>
       </p:sp>
@@ -6436,40 +7152,32 @@
           <a:bodyPr/>
           <a:lstStyle/>
           <a:p>
-            <a:endParaRPr lang="en-US"/>
-          </a:p>
-        </p:txBody>
-      </p:sp>
-      <p:pic>
-        <p:nvPicPr>
-          <p:cNvPr id="4" name="Picture 3" descr=":::::::Downloads:GDS-ObservationSequence.jpg"/>
-          <p:cNvPicPr/>
-          <p:nvPr/>
-        </p:nvPicPr>
-        <p:blipFill>
-          <a:blip r:embed="rId2"/>
-          <a:srcRect/>
-          <a:stretch>
-            <a:fillRect/>
-          </a:stretch>
-        </p:blipFill>
-        <p:spPr bwMode="auto">
-          <a:xfrm>
-            <a:off x="1511300" y="1828800"/>
-            <a:ext cx="6121400" cy="4538345"/>
-          </a:xfrm>
-          <a:prstGeom prst="rect">
-            <a:avLst/>
-          </a:prstGeom>
-          <a:noFill/>
-          <a:ln w="9525">
-            <a:noFill/>
-            <a:miter lim="800000"/>
-            <a:headEnd/>
-            <a:tailEnd/>
-          </a:ln>
-        </p:spPr>
-      </p:pic>
+            <a:r>
+              <a:rPr lang="en-US" dirty="0" smtClean="0"/>
+              <a:t>Startup/Shutdown Procedure</a:t>
+            </a:r>
+          </a:p>
+          <a:p>
+            <a:r>
+              <a:rPr lang="en-US" dirty="0" smtClean="0"/>
+              <a:t>Logging</a:t>
+            </a:r>
+          </a:p>
+          <a:p>
+            <a:r>
+              <a:rPr lang="en-US" dirty="0" smtClean="0"/>
+              <a:t>Troubleshooting</a:t>
+            </a:r>
+          </a:p>
+          <a:p>
+            <a:r>
+              <a:rPr lang="en-US" dirty="0" smtClean="0"/>
+              <a:t>Heartbeat and status</a:t>
+            </a:r>
+            <a:endParaRPr lang="en-US" dirty="0"/>
+          </a:p>
+        </p:txBody>
+      </p:sp>
     </p:spTree>
   </p:cSld>
   <p:clrMapOvr>
@@ -6478,105 +7186,7 @@
 </p:sld>
 </file>
 
-<file path=ppt/slides/slide2.xml><?xml version="1.0" encoding="utf-8"?>
-<p:sld xmlns:a="http://schemas.openxmlformats.org/drawingml/2006/main" xmlns:r="http://schemas.openxmlformats.org/officeDocument/2006/relationships" xmlns:mc="http://schemas.openxmlformats.org/markup-compatibility/2006" xmlns:mv="urn:schemas-microsoft-com:mac:vml" xmlns:p="http://schemas.openxmlformats.org/presentationml/2006/main" mc:Ignorable="mv" mc:PreserveAttributes="mv:*">
-  <p:cSld>
-    <p:spTree>
-      <p:nvGrpSpPr>
-        <p:cNvPr id="1" name=""/>
-        <p:cNvGrpSpPr/>
-        <p:nvPr/>
-      </p:nvGrpSpPr>
-      <p:grpSpPr>
-        <a:xfrm>
-          <a:off x="0" y="0"/>
-          <a:ext cx="0" cy="0"/>
-          <a:chOff x="0" y="0"/>
-          <a:chExt cx="0" cy="0"/>
-        </a:xfrm>
-      </p:grpSpPr>
-      <p:sp>
-        <p:nvSpPr>
-          <p:cNvPr id="2" name="Title 1"/>
-          <p:cNvSpPr>
-            <a:spLocks noGrp="1"/>
-          </p:cNvSpPr>
-          <p:nvPr>
-            <p:ph type="title"/>
-          </p:nvPr>
-        </p:nvSpPr>
-        <p:spPr/>
-        <p:txBody>
-          <a:bodyPr/>
-          <a:lstStyle/>
-          <a:p>
-            <a:r>
-              <a:rPr lang="en-US" dirty="0" smtClean="0"/>
-              <a:t>Purpose</a:t>
-            </a:r>
-            <a:endParaRPr lang="en-US" dirty="0"/>
-          </a:p>
-        </p:txBody>
-      </p:sp>
-      <p:sp>
-        <p:nvSpPr>
-          <p:cNvPr id="3" name="Content Placeholder 2"/>
-          <p:cNvSpPr>
-            <a:spLocks noGrp="1"/>
-          </p:cNvSpPr>
-          <p:nvPr>
-            <p:ph idx="1"/>
-          </p:nvPr>
-        </p:nvSpPr>
-        <p:spPr/>
-        <p:txBody>
-          <a:bodyPr/>
-          <a:lstStyle/>
-          <a:p>
-            <a:pPr lvl="0"/>
-            <a:r>
-              <a:rPr lang="en-US" dirty="0" smtClean="0"/>
-              <a:t>DHS too complex</a:t>
-            </a:r>
-          </a:p>
-          <a:p>
-            <a:pPr lvl="0"/>
-            <a:r>
-              <a:rPr lang="en-US" dirty="0" smtClean="0"/>
-              <a:t>Difficult to maintain and modify.</a:t>
-            </a:r>
-          </a:p>
-          <a:p>
-            <a:pPr lvl="0"/>
-            <a:r>
-              <a:rPr lang="en-US" dirty="0" smtClean="0"/>
-              <a:t>Compatibility with GIAPI</a:t>
-            </a:r>
-          </a:p>
-          <a:p>
-            <a:pPr lvl="0"/>
-            <a:r>
-              <a:rPr lang="en-US" dirty="0" smtClean="0"/>
-              <a:t>Requirements of GIAPI-based Instruments</a:t>
-            </a:r>
-          </a:p>
-          <a:p>
-            <a:pPr>
-              <a:buNone/>
-            </a:pPr>
-            <a:endParaRPr lang="en-US" dirty="0"/>
-          </a:p>
-        </p:txBody>
-      </p:sp>
-    </p:spTree>
-  </p:cSld>
-  <p:clrMapOvr>
-    <a:masterClrMapping/>
-  </p:clrMapOvr>
-</p:sld>
-</file>
-
-<file path=ppt/slides/slide20.xml><?xml version="1.0" encoding="utf-8"?>
+<file path=ppt/slides/slide26.xml><?xml version="1.0" encoding="utf-8"?>
 <p:sld xmlns:a="http://schemas.openxmlformats.org/drawingml/2006/main" xmlns:r="http://schemas.openxmlformats.org/officeDocument/2006/relationships" xmlns:mc="http://schemas.openxmlformats.org/markup-compatibility/2006" xmlns:mv="urn:schemas-microsoft-com:mac:vml" xmlns:p="http://schemas.openxmlformats.org/presentationml/2006/main" mc:Ignorable="mv" mc:PreserveAttributes="mv:*">
   <p:cSld>
     <p:spTree>
@@ -6705,7 +7315,7 @@
 </p:sld>
 </file>
 
-<file path=ppt/slides/slide21.xml><?xml version="1.0" encoding="utf-8"?>
+<file path=ppt/slides/slide27.xml><?xml version="1.0" encoding="utf-8"?>
 <p:sld xmlns:a="http://schemas.openxmlformats.org/drawingml/2006/main" xmlns:r="http://schemas.openxmlformats.org/officeDocument/2006/relationships" xmlns:mc="http://schemas.openxmlformats.org/markup-compatibility/2006" xmlns:mv="urn:schemas-microsoft-com:mac:vml" xmlns:p="http://schemas.openxmlformats.org/presentationml/2006/main" mc:Ignorable="mv" mc:PreserveAttributes="mv:*">
   <p:cSld>
     <p:spTree>
@@ -6808,7 +7418,7 @@
 </p:sld>
 </file>
 
-<file path=ppt/slides/slide22.xml><?xml version="1.0" encoding="utf-8"?>
+<file path=ppt/slides/slide28.xml><?xml version="1.0" encoding="utf-8"?>
 <p:sld xmlns:a="http://schemas.openxmlformats.org/drawingml/2006/main" xmlns:r="http://schemas.openxmlformats.org/officeDocument/2006/relationships" xmlns:mc="http://schemas.openxmlformats.org/markup-compatibility/2006" xmlns:mv="urn:schemas-microsoft-com:mac:vml" xmlns:p="http://schemas.openxmlformats.org/presentationml/2006/main" mc:Ignorable="mv" mc:PreserveAttributes="mv:*">
   <p:cSld>
     <p:spTree>
@@ -6842,47 +7452,48 @@
           <a:p>
             <a:r>
               <a:rPr lang="en-US" dirty="0" smtClean="0"/>
-              <a:t>Operational Aspects</a:t>
+              <a:t>Observation Sequence in Detail</a:t>
             </a:r>
             <a:endParaRPr lang="en-US" dirty="0"/>
           </a:p>
         </p:txBody>
       </p:sp>
-      <p:sp>
-        <p:nvSpPr>
-          <p:cNvPr id="3" name="Content Placeholder 2"/>
-          <p:cNvSpPr>
-            <a:spLocks noGrp="1"/>
-          </p:cNvSpPr>
-          <p:nvPr>
-            <p:ph idx="1"/>
-          </p:nvPr>
-        </p:nvSpPr>
-        <p:spPr/>
-        <p:txBody>
-          <a:bodyPr/>
-          <a:lstStyle/>
-          <a:p>
-            <a:r>
-              <a:rPr lang="en-US" dirty="0" smtClean="0"/>
-              <a:t>Startup/Shutdown Procedure</a:t>
-            </a:r>
-          </a:p>
-          <a:p>
-            <a:r>
-              <a:rPr lang="en-US" dirty="0" smtClean="0"/>
-              <a:t>Logging</a:t>
-            </a:r>
-          </a:p>
-          <a:p>
-            <a:r>
-              <a:rPr lang="en-US" dirty="0" smtClean="0"/>
-              <a:t>Troubleshooting</a:t>
-            </a:r>
-            <a:endParaRPr lang="en-US" dirty="0"/>
-          </a:p>
-        </p:txBody>
-      </p:sp>
+      <p:pic>
+        <p:nvPicPr>
+          <p:cNvPr id="7" name="Picture 6"/>
+          <p:cNvPicPr>
+            <a:picLocks noChangeAspect="1"/>
+          </p:cNvPicPr>
+          <p:nvPr/>
+        </p:nvPicPr>
+        <mc:AlternateContent>
+          <mc:Choice xmlns:ma="http://schemas.microsoft.com/office/mac/drawingml/2008/main" Requires="ma">
+            <p:blipFill>
+              <a:blip r:embed="rId2"/>
+              <a:stretch>
+                <a:fillRect/>
+              </a:stretch>
+            </p:blipFill>
+          </mc:Choice>
+          <mc:Fallback>
+            <p:blipFill>
+              <a:blip r:embed="rId3"/>
+              <a:stretch>
+                <a:fillRect/>
+              </a:stretch>
+            </p:blipFill>
+          </mc:Fallback>
+        </mc:AlternateContent>
+        <p:spPr>
+          <a:xfrm>
+            <a:off x="1233687" y="1546891"/>
+            <a:ext cx="6452036" cy="4886561"/>
+          </a:xfrm>
+          <a:prstGeom prst="rect">
+            <a:avLst/>
+          </a:prstGeom>
+        </p:spPr>
+      </p:pic>
     </p:spTree>
   </p:cSld>
   <p:clrMapOvr>
@@ -6910,7 +7521,7 @@
       </p:grpSpPr>
       <p:sp>
         <p:nvSpPr>
-          <p:cNvPr id="2" name="Title 1"/>
+          <p:cNvPr id="4" name="Title 3"/>
           <p:cNvSpPr>
             <a:spLocks noGrp="1"/>
           </p:cNvSpPr>
@@ -6925,7 +7536,7 @@
           <a:p>
             <a:r>
               <a:rPr lang="en-US" dirty="0" smtClean="0"/>
-              <a:t>Overview</a:t>
+              <a:t>GDS Overview</a:t>
             </a:r>
             <a:endParaRPr lang="en-US" dirty="0"/>
           </a:p>
@@ -6933,56 +7544,20 @@
       </p:sp>
       <p:sp>
         <p:nvSpPr>
-          <p:cNvPr id="3" name="Content Placeholder 2"/>
-          <p:cNvSpPr>
-            <a:spLocks noGrp="1"/>
-          </p:cNvSpPr>
-          <p:nvPr>
-            <p:ph idx="1"/>
-          </p:nvPr>
-        </p:nvSpPr>
-        <p:spPr/>
-        <p:txBody>
-          <a:bodyPr/>
-          <a:lstStyle/>
-          <a:p>
-            <a:pPr lvl="0"/>
-            <a:r>
-              <a:rPr lang="en-US" dirty="0" smtClean="0"/>
-              <a:t>Listen for observation events from the instrument </a:t>
-            </a:r>
-          </a:p>
-          <a:p>
-            <a:pPr lvl="0"/>
-            <a:r>
-              <a:rPr lang="en-US" dirty="0" smtClean="0"/>
-              <a:t>Gather data from observatory systems</a:t>
-            </a:r>
-          </a:p>
-          <a:p>
-            <a:pPr lvl="0"/>
-            <a:r>
-              <a:rPr lang="en-US" dirty="0" smtClean="0"/>
-              <a:t>Accept external input from systems that cannot be queried externally like </a:t>
-            </a:r>
-            <a:r>
-              <a:rPr lang="en-US" dirty="0" err="1" smtClean="0"/>
-              <a:t>Seqexec</a:t>
-            </a:r>
-            <a:endParaRPr lang="en-US" dirty="0" smtClean="0"/>
-          </a:p>
-          <a:p>
-            <a:pPr lvl="0"/>
-            <a:r>
-              <a:rPr lang="en-US" dirty="0" smtClean="0"/>
-              <a:t>Complete the FITS files with data collected during an observation</a:t>
-            </a:r>
-          </a:p>
-          <a:p>
-            <a:pPr>
-              <a:buNone/>
-            </a:pPr>
-            <a:endParaRPr lang="en-US" dirty="0"/>
+          <p:cNvPr id="5" name="Text Placeholder 4"/>
+          <p:cNvSpPr>
+            <a:spLocks noGrp="1"/>
+          </p:cNvSpPr>
+          <p:nvPr>
+            <p:ph type="body" idx="1"/>
+          </p:nvPr>
+        </p:nvSpPr>
+        <p:spPr/>
+        <p:txBody>
+          <a:bodyPr/>
+          <a:lstStyle/>
+          <a:p>
+            <a:endParaRPr lang="en-US"/>
           </a:p>
         </p:txBody>
       </p:sp>
@@ -7028,55 +7603,108 @@
           <a:p>
             <a:r>
               <a:rPr lang="en-US" dirty="0" smtClean="0"/>
-              <a:t>System Diagram</a:t>
+              <a:t>Overview</a:t>
             </a:r>
             <a:endParaRPr lang="en-US" dirty="0"/>
           </a:p>
         </p:txBody>
       </p:sp>
-      <p:pic>
-        <p:nvPicPr>
-          <p:cNvPr id="4" name="Content Placeholder 3"/>
-          <p:cNvPicPr>
-            <a:picLocks noGrp="1"/>
-          </p:cNvPicPr>
+      <p:sp>
+        <p:nvSpPr>
+          <p:cNvPr id="3" name="Content Placeholder 2"/>
+          <p:cNvSpPr>
+            <a:spLocks noGrp="1"/>
+          </p:cNvSpPr>
           <p:nvPr>
             <p:ph idx="1"/>
           </p:nvPr>
-        </p:nvPicPr>
-        <mc:AlternateContent>
-          <mc:Choice xmlns:ma="http://schemas.microsoft.com/office/mac/drawingml/2008/main" Requires="ma">
-            <p:blipFill>
-              <a:blip r:embed="rId2"/>
-              <a:srcRect l="-17447" r="-17447"/>
-              <a:stretch>
-                <a:fillRect/>
-              </a:stretch>
-            </p:blipFill>
-          </mc:Choice>
-          <mc:Fallback>
-            <p:blipFill>
-              <a:blip r:embed="rId3"/>
-              <a:srcRect l="-17447" r="-17447"/>
-              <a:stretch>
-                <a:fillRect/>
-              </a:stretch>
-            </p:blipFill>
-          </mc:Fallback>
-        </mc:AlternateContent>
-        <p:spPr bwMode="auto">
-          <a:prstGeom prst="rect">
-            <a:avLst/>
-          </a:prstGeom>
-          <a:noFill/>
-          <a:ln w="9525">
-            <a:noFill/>
-            <a:miter lim="800000"/>
-            <a:headEnd/>
-            <a:tailEnd/>
-          </a:ln>
-        </p:spPr>
-      </p:pic>
+        </p:nvSpPr>
+        <p:spPr/>
+        <p:txBody>
+          <a:bodyPr>
+            <a:normAutofit lnSpcReduction="10000"/>
+          </a:bodyPr>
+          <a:lstStyle/>
+          <a:p>
+            <a:pPr lvl="0"/>
+            <a:r>
+              <a:rPr lang="en-US" dirty="0" smtClean="0"/>
+              <a:t>GIAPI based instruments </a:t>
+            </a:r>
+            <a:r>
+              <a:rPr lang="en-US" dirty="0" smtClean="0"/>
+              <a:t>write standard FITS files with a basic set of keywords</a:t>
+            </a:r>
+            <a:endParaRPr lang="en-US" dirty="0" smtClean="0"/>
+          </a:p>
+          <a:p>
+            <a:r>
+              <a:rPr lang="en-US" dirty="0" smtClean="0"/>
+              <a:t>GDS completes the FITS files with values collected during an observation</a:t>
+            </a:r>
+          </a:p>
+          <a:p>
+            <a:pPr lvl="0"/>
+            <a:r>
+              <a:rPr lang="en-US" dirty="0" smtClean="0"/>
+              <a:t>GDS </a:t>
+            </a:r>
+            <a:r>
+              <a:rPr lang="en-US" dirty="0" smtClean="0"/>
+              <a:t>l</a:t>
+            </a:r>
+            <a:r>
+              <a:rPr lang="en-US" dirty="0" smtClean="0"/>
+              <a:t>istens </a:t>
+            </a:r>
+            <a:r>
+              <a:rPr lang="en-US" dirty="0" smtClean="0"/>
+              <a:t>for observation events from the instrument</a:t>
+            </a:r>
+            <a:r>
+              <a:rPr lang="en-US" dirty="0" smtClean="0"/>
+              <a:t> that trigger data collection</a:t>
+            </a:r>
+          </a:p>
+          <a:p>
+            <a:pPr lvl="0"/>
+            <a:r>
+              <a:rPr lang="en-US" dirty="0" smtClean="0"/>
+              <a:t>GDS collects FITS keyword values from </a:t>
+            </a:r>
+            <a:r>
+              <a:rPr lang="en-US" dirty="0" smtClean="0"/>
+              <a:t>observatory </a:t>
+            </a:r>
+            <a:r>
+              <a:rPr lang="en-US" dirty="0" smtClean="0"/>
+              <a:t>systems (OCS, TCS) and instruments</a:t>
+            </a:r>
+          </a:p>
+          <a:p>
+            <a:pPr lvl="0"/>
+            <a:r>
+              <a:rPr lang="en-US" dirty="0" smtClean="0"/>
+              <a:t>GDS accepts FITS keyword values from external systems </a:t>
+            </a:r>
+            <a:r>
+              <a:rPr lang="en-US" dirty="0" smtClean="0"/>
+              <a:t>that cannot be queried externally like </a:t>
+            </a:r>
+            <a:r>
+              <a:rPr lang="en-US" dirty="0" err="1" smtClean="0"/>
+              <a:t>Seqexec</a:t>
+            </a:r>
+            <a:endParaRPr lang="en-US" dirty="0" smtClean="0"/>
+          </a:p>
+          <a:p>
+            <a:pPr>
+              <a:buNone/>
+            </a:pPr>
+            <a:endParaRPr lang="en-US" dirty="0"/>
+          </a:p>
+        </p:txBody>
+      </p:sp>
     </p:spTree>
   </p:cSld>
   <p:clrMapOvr>
@@ -7119,7 +7747,7 @@
           <a:p>
             <a:r>
               <a:rPr lang="en-US" dirty="0" smtClean="0"/>
-              <a:t>Observation Sequence</a:t>
+              <a:t>GDS Interactions</a:t>
             </a:r>
             <a:endParaRPr lang="en-US" dirty="0"/>
           </a:p>
@@ -7127,22 +7755,39 @@
       </p:sp>
       <p:pic>
         <p:nvPicPr>
-          <p:cNvPr id="4" name="Content Placeholder 3" descr="GDS-Sequence.jpg"/>
+          <p:cNvPr id="8" name="Picture 7"/>
           <p:cNvPicPr>
-            <a:picLocks noGrp="1" noChangeAspect="1"/>
+            <a:picLocks noChangeAspect="1"/>
           </p:cNvPicPr>
-          <p:nvPr>
-            <p:ph idx="1"/>
-          </p:nvPr>
+          <p:nvPr/>
         </p:nvPicPr>
-        <p:blipFill>
-          <a:blip r:embed="rId2"/>
-          <a:srcRect l="-10985" r="-10985"/>
-          <a:stretch>
-            <a:fillRect/>
-          </a:stretch>
-        </p:blipFill>
-        <p:spPr/>
+        <mc:AlternateContent>
+          <mc:Choice xmlns:ma="http://schemas.microsoft.com/office/mac/drawingml/2008/main" Requires="ma">
+            <p:blipFill>
+              <a:blip r:embed="rId2"/>
+              <a:stretch>
+                <a:fillRect/>
+              </a:stretch>
+            </p:blipFill>
+          </mc:Choice>
+          <mc:Fallback>
+            <p:blipFill>
+              <a:blip r:embed="rId3"/>
+              <a:stretch>
+                <a:fillRect/>
+              </a:stretch>
+            </p:blipFill>
+          </mc:Fallback>
+        </mc:AlternateContent>
+        <p:spPr>
+          <a:xfrm>
+            <a:off x="1320775" y="1556222"/>
+            <a:ext cx="6332860" cy="4562861"/>
+          </a:xfrm>
+          <a:prstGeom prst="rect">
+            <a:avLst/>
+          </a:prstGeom>
+        </p:spPr>
       </p:pic>
     </p:spTree>
   </p:cSld>
@@ -7186,51 +7831,48 @@
           <a:p>
             <a:r>
               <a:rPr lang="en-US" dirty="0" smtClean="0"/>
-              <a:t>Data Values Composition</a:t>
+              <a:t>Observation Sequence</a:t>
             </a:r>
             <a:endParaRPr lang="en-US" dirty="0"/>
           </a:p>
         </p:txBody>
       </p:sp>
-      <p:sp>
-        <p:nvSpPr>
-          <p:cNvPr id="3" name="Content Placeholder 2"/>
-          <p:cNvSpPr>
-            <a:spLocks noGrp="1"/>
-          </p:cNvSpPr>
-          <p:nvPr>
-            <p:ph idx="1"/>
-          </p:nvPr>
-        </p:nvSpPr>
-        <p:spPr/>
-        <p:txBody>
-          <a:bodyPr/>
-          <a:lstStyle/>
-          <a:p>
-            <a:r>
-              <a:rPr lang="en-US" dirty="0" smtClean="0"/>
-              <a:t>Listen for Observation Events</a:t>
-            </a:r>
-          </a:p>
-          <a:p>
-            <a:r>
-              <a:rPr lang="en-US" dirty="0" smtClean="0"/>
-              <a:t>Sample data</a:t>
-            </a:r>
-          </a:p>
-          <a:p>
-            <a:r>
-              <a:rPr lang="en-US" dirty="0" smtClean="0"/>
-              <a:t>Add data to </a:t>
-            </a:r>
-            <a:r>
-              <a:rPr lang="en-US" smtClean="0"/>
-              <a:t>the file</a:t>
-            </a:r>
-            <a:endParaRPr lang="en-US"/>
-          </a:p>
-        </p:txBody>
-      </p:sp>
+      <p:pic>
+        <p:nvPicPr>
+          <p:cNvPr id="7" name="Picture 6"/>
+          <p:cNvPicPr>
+            <a:picLocks noChangeAspect="1"/>
+          </p:cNvPicPr>
+          <p:nvPr/>
+        </p:nvPicPr>
+        <mc:AlternateContent>
+          <mc:Choice xmlns:ma="http://schemas.microsoft.com/office/mac/drawingml/2008/main" Requires="ma">
+            <p:blipFill>
+              <a:blip r:embed="rId2"/>
+              <a:stretch>
+                <a:fillRect/>
+              </a:stretch>
+            </p:blipFill>
+          </mc:Choice>
+          <mc:Fallback>
+            <p:blipFill>
+              <a:blip r:embed="rId3"/>
+              <a:stretch>
+                <a:fillRect/>
+              </a:stretch>
+            </p:blipFill>
+          </mc:Fallback>
+        </mc:AlternateContent>
+        <p:spPr>
+          <a:xfrm>
+            <a:off x="425621" y="1781636"/>
+            <a:ext cx="8395223" cy="4567678"/>
+          </a:xfrm>
+          <a:prstGeom prst="rect">
+            <a:avLst/>
+          </a:prstGeom>
+        </p:spPr>
+      </p:pic>
     </p:spTree>
   </p:cSld>
   <p:clrMapOvr>
@@ -7273,71 +7915,48 @@
           <a:p>
             <a:r>
               <a:rPr lang="en-US" dirty="0" smtClean="0"/>
-              <a:t>Observation Event Driven Data Collection</a:t>
+              <a:t>Starting an Observation</a:t>
             </a:r>
             <a:endParaRPr lang="en-US" dirty="0"/>
           </a:p>
         </p:txBody>
       </p:sp>
-      <p:sp>
-        <p:nvSpPr>
-          <p:cNvPr id="3" name="Content Placeholder 2"/>
-          <p:cNvSpPr>
-            <a:spLocks noGrp="1"/>
-          </p:cNvSpPr>
-          <p:nvPr>
-            <p:ph idx="1"/>
-          </p:nvPr>
-        </p:nvSpPr>
-        <p:spPr/>
-        <p:txBody>
-          <a:bodyPr/>
-          <a:lstStyle/>
-          <a:p>
-            <a:r>
-              <a:rPr lang="en-US" dirty="0" smtClean="0"/>
-              <a:t>OBS_PREP</a:t>
-            </a:r>
-          </a:p>
-          <a:p>
-            <a:r>
-              <a:rPr lang="en-US" dirty="0" smtClean="0"/>
-              <a:t>OBS_START_ACQ</a:t>
-            </a:r>
-          </a:p>
-          <a:p>
-            <a:r>
-              <a:rPr lang="en-US" dirty="0" smtClean="0"/>
-              <a:t>OBS_END_ACQ</a:t>
-            </a:r>
-          </a:p>
-          <a:p>
-            <a:r>
-              <a:rPr lang="en-US" dirty="0" smtClean="0"/>
-              <a:t>OBS_START_READOUT</a:t>
-            </a:r>
-          </a:p>
-          <a:p>
-            <a:r>
-              <a:rPr lang="en-US" dirty="0" smtClean="0"/>
-              <a:t>OBS_END_READOUT</a:t>
-            </a:r>
-          </a:p>
-          <a:p>
-            <a:r>
-              <a:rPr lang="en-US" dirty="0" smtClean="0"/>
-              <a:t>OBS_START_DSET_WRITE</a:t>
-            </a:r>
-          </a:p>
-          <a:p>
-            <a:r>
-              <a:rPr lang="en-US" dirty="0" smtClean="0"/>
-              <a:t>OBS_END_DSET_WRITE</a:t>
-            </a:r>
-            <a:endParaRPr lang="en-US" dirty="0"/>
-          </a:p>
-        </p:txBody>
-      </p:sp>
+      <p:pic>
+        <p:nvPicPr>
+          <p:cNvPr id="9" name="Picture 8"/>
+          <p:cNvPicPr>
+            <a:picLocks noChangeAspect="1"/>
+          </p:cNvPicPr>
+          <p:nvPr/>
+        </p:nvPicPr>
+        <mc:AlternateContent>
+          <mc:Choice xmlns:ma="http://schemas.microsoft.com/office/mac/drawingml/2008/main" Requires="ma">
+            <p:blipFill>
+              <a:blip r:embed="rId2"/>
+              <a:stretch>
+                <a:fillRect/>
+              </a:stretch>
+            </p:blipFill>
+          </mc:Choice>
+          <mc:Fallback>
+            <p:blipFill>
+              <a:blip r:embed="rId3"/>
+              <a:stretch>
+                <a:fillRect/>
+              </a:stretch>
+            </p:blipFill>
+          </mc:Fallback>
+        </mc:AlternateContent>
+        <p:spPr>
+          <a:xfrm>
+            <a:off x="398556" y="1737818"/>
+            <a:ext cx="8436525" cy="4590150"/>
+          </a:xfrm>
+          <a:prstGeom prst="rect">
+            <a:avLst/>
+          </a:prstGeom>
+        </p:spPr>
+      </p:pic>
     </p:spTree>
   </p:cSld>
   <p:clrMapOvr>
@@ -7380,7 +7999,7 @@
           <a:p>
             <a:r>
               <a:rPr lang="en-US" dirty="0" smtClean="0"/>
-              <a:t>Completion of FITS Files</a:t>
+              <a:t>Starting an Observation</a:t>
             </a:r>
             <a:endParaRPr lang="en-US" dirty="0"/>
           </a:p>
@@ -7403,13 +8022,77 @@
           <a:p>
             <a:r>
               <a:rPr lang="en-US" dirty="0" smtClean="0"/>
-              <a:t>Instrument writes FITS to NFS drive</a:t>
-            </a:r>
-          </a:p>
-          <a:p>
-            <a:r>
-              <a:rPr lang="en-US" dirty="0" smtClean="0"/>
-              <a:t>GDS adds FITS headers</a:t>
+              <a:t>User initiates an observe through the </a:t>
+            </a:r>
+            <a:r>
+              <a:rPr lang="en-US" dirty="0" err="1" smtClean="0"/>
+              <a:t>Seqexec</a:t>
+            </a:r>
+            <a:endParaRPr lang="en-US" dirty="0" smtClean="0"/>
+          </a:p>
+          <a:p>
+            <a:r>
+              <a:rPr lang="en-US" dirty="0" err="1" smtClean="0"/>
+              <a:t>Seqexec</a:t>
+            </a:r>
+            <a:r>
+              <a:rPr lang="en-US" dirty="0" smtClean="0"/>
+              <a:t> gets </a:t>
+            </a:r>
+            <a:r>
+              <a:rPr lang="en-US" dirty="0" err="1" smtClean="0"/>
+              <a:t>DataLabel</a:t>
+            </a:r>
+            <a:r>
+              <a:rPr lang="en-US" dirty="0" smtClean="0"/>
+              <a:t> for the observation’s </a:t>
+            </a:r>
+            <a:r>
+              <a:rPr lang="en-US" dirty="0" err="1" smtClean="0"/>
+              <a:t>DataSet</a:t>
+            </a:r>
+            <a:endParaRPr lang="en-US" dirty="0" smtClean="0"/>
+          </a:p>
+          <a:p>
+            <a:r>
+              <a:rPr lang="en-US" dirty="0" err="1" smtClean="0"/>
+              <a:t>Seqexec</a:t>
+            </a:r>
+            <a:r>
+              <a:rPr lang="en-US" dirty="0" smtClean="0"/>
+              <a:t> sends to GDS the </a:t>
+            </a:r>
+            <a:r>
+              <a:rPr lang="en-US" dirty="0" err="1" smtClean="0"/>
+              <a:t>DataLabel</a:t>
+            </a:r>
+            <a:r>
+              <a:rPr lang="en-US" dirty="0" smtClean="0"/>
+              <a:t> and Program ID</a:t>
+            </a:r>
+          </a:p>
+          <a:p>
+            <a:r>
+              <a:rPr lang="en-US" dirty="0" err="1" smtClean="0"/>
+              <a:t>Seqexec</a:t>
+            </a:r>
+            <a:r>
+              <a:rPr lang="en-US" dirty="0" smtClean="0"/>
+              <a:t> can send FITS keywords for the current observation to the GDS</a:t>
+            </a:r>
+          </a:p>
+          <a:p>
+            <a:r>
+              <a:rPr lang="en-US" dirty="0" err="1" smtClean="0"/>
+              <a:t>Seqexec</a:t>
+            </a:r>
+            <a:r>
+              <a:rPr lang="en-US" dirty="0" smtClean="0"/>
+              <a:t> sends an Observe Sequence Command to the instrument with the </a:t>
+            </a:r>
+            <a:r>
+              <a:rPr lang="en-US" dirty="0" err="1" smtClean="0"/>
+              <a:t>DataLabel</a:t>
             </a:r>
             <a:endParaRPr lang="en-US" dirty="0"/>
           </a:p>
@@ -7456,16 +8139,12 @@
           <a:lstStyle/>
           <a:p>
             <a:r>
-              <a:rPr lang="en-US" b="1" dirty="0" smtClean="0"/>
-              <a:t>Sending FITS Headers from </a:t>
-            </a:r>
-            <a:r>
-              <a:rPr lang="en-US" b="1" dirty="0" err="1" smtClean="0"/>
-              <a:t>Seqexec</a:t>
-            </a:r>
-            <a:r>
-              <a:rPr lang="en-US" b="1" dirty="0" smtClean="0"/>
-              <a:t> to GDS</a:t>
+              <a:rPr lang="en-US" dirty="0" smtClean="0"/>
+              <a:t>Observation </a:t>
+            </a:r>
+            <a:r>
+              <a:rPr lang="en-US" dirty="0" smtClean="0"/>
+              <a:t>Event Driven Data Collection</a:t>
             </a:r>
             <a:endParaRPr lang="en-US" dirty="0"/>
           </a:p>
@@ -7483,12 +8162,57 @@
         </p:nvSpPr>
         <p:spPr/>
         <p:txBody>
-          <a:bodyPr/>
-          <a:lstStyle/>
-          <a:p>
-            <a:r>
-              <a:rPr lang="en-US" dirty="0" smtClean="0"/>
-              <a:t>XMLRPC</a:t>
+          <a:bodyPr>
+            <a:normAutofit fontScale="92500" lnSpcReduction="20000"/>
+          </a:bodyPr>
+          <a:lstStyle/>
+          <a:p>
+            <a:r>
+              <a:rPr lang="en-US" dirty="0" smtClean="0"/>
+              <a:t>During the observation the instrument publishes the following observation events</a:t>
+            </a:r>
+          </a:p>
+          <a:p>
+            <a:r>
+              <a:rPr lang="en-US" dirty="0" smtClean="0"/>
+              <a:t>OBS_PREP</a:t>
+            </a:r>
+            <a:endParaRPr lang="en-US" dirty="0" smtClean="0"/>
+          </a:p>
+          <a:p>
+            <a:r>
+              <a:rPr lang="en-US" dirty="0" smtClean="0"/>
+              <a:t>OBS_START_ACQ</a:t>
+            </a:r>
+          </a:p>
+          <a:p>
+            <a:r>
+              <a:rPr lang="en-US" dirty="0" smtClean="0"/>
+              <a:t>OBS_END_ACQ</a:t>
+            </a:r>
+          </a:p>
+          <a:p>
+            <a:r>
+              <a:rPr lang="en-US" dirty="0" smtClean="0"/>
+              <a:t>OBS_START_READOUT</a:t>
+            </a:r>
+          </a:p>
+          <a:p>
+            <a:r>
+              <a:rPr lang="en-US" dirty="0" smtClean="0"/>
+              <a:t>OBS_END_READOUT</a:t>
+            </a:r>
+          </a:p>
+          <a:p>
+            <a:r>
+              <a:rPr lang="en-US" dirty="0" smtClean="0"/>
+              <a:t>OBS_START_DSET_WRITE</a:t>
+            </a:r>
+          </a:p>
+          <a:p>
+            <a:r>
+              <a:rPr lang="en-US" dirty="0" smtClean="0"/>
+              <a:t>OBS_END_DSET_WRITE</a:t>
             </a:r>
             <a:endParaRPr lang="en-US" dirty="0"/>
           </a:p>

</xml_diff>

<commit_message>
Fixed observation events table and general rewie
git-svn-id: http://source.gemini.edu/software/giapi/giapi-osgi/trunk@35354 ee6ba543-07f8-4773-b02c-01d50e9d00ba
</commit_message>
<xml_diff>
--- a/gds-api/src/main/doc/GDSDesignReview.pptx
+++ b/gds-api/src/main/doc/GDSDesignReview.pptx
@@ -23,16 +23,17 @@
     <p:sldId id="276" r:id="rId17"/>
     <p:sldId id="277" r:id="rId18"/>
     <p:sldId id="278" r:id="rId19"/>
-    <p:sldId id="266" r:id="rId20"/>
+    <p:sldId id="286" r:id="rId20"/>
     <p:sldId id="285" r:id="rId21"/>
-    <p:sldId id="268" r:id="rId22"/>
-    <p:sldId id="269" r:id="rId23"/>
-    <p:sldId id="270" r:id="rId24"/>
-    <p:sldId id="271" r:id="rId25"/>
-    <p:sldId id="275" r:id="rId26"/>
-    <p:sldId id="273" r:id="rId27"/>
-    <p:sldId id="274" r:id="rId28"/>
-    <p:sldId id="272" r:id="rId29"/>
+    <p:sldId id="266" r:id="rId22"/>
+    <p:sldId id="268" r:id="rId23"/>
+    <p:sldId id="269" r:id="rId24"/>
+    <p:sldId id="270" r:id="rId25"/>
+    <p:sldId id="271" r:id="rId26"/>
+    <p:sldId id="275" r:id="rId27"/>
+    <p:sldId id="273" r:id="rId28"/>
+    <p:sldId id="274" r:id="rId29"/>
+    <p:sldId id="272" r:id="rId30"/>
   </p:sldIdLst>
   <p:sldSz cx="9144000" cy="6858000" type="screen4x3"/>
   <p:notesSz cx="6858000" cy="9144000"/>
@@ -5582,8 +5583,8 @@
           </p:cNvPicPr>
           <p:nvPr/>
         </p:nvPicPr>
-        <mc:AlternateContent>
-          <mc:Choice xmlns:ma="http://schemas.microsoft.com/office/mac/drawingml/2008/main" Requires="ma">
+        <mc:AlternateContent xmlns:ma="http://schemas.microsoft.com/office/mac/drawingml/2008/main">
+          <mc:Choice Requires="ma">
             <p:blipFill>
               <a:blip r:embed="rId2"/>
               <a:stretch>
@@ -5591,7 +5592,7 @@
               </a:stretch>
             </p:blipFill>
           </mc:Choice>
-          <mc:Fallback>
+          <mc:Fallback xmlns:p="http://schemas.openxmlformats.org/presentationml/2006/main" xmlns:mv="urn:schemas-microsoft-com:mac:vml" xmlns:mc="http://schemas.openxmlformats.org/markup-compatibility/2006" xmlns:r="http://schemas.openxmlformats.org/officeDocument/2006/relationships" xmlns:a="http://schemas.openxmlformats.org/drawingml/2006/main" xmlns="">
             <p:blipFill>
               <a:blip r:embed="rId3"/>
               <a:stretch>
@@ -5675,13 +5676,21 @@
           <a:p>
             <a:r>
               <a:rPr lang="en-US" dirty="0" smtClean="0"/>
-              <a:t>GDS listens to Instrument generated Observation Events</a:t>
-            </a:r>
-          </a:p>
-          <a:p>
-            <a:r>
-              <a:rPr lang="en-US" dirty="0" smtClean="0"/>
-              <a:t>GDS collects FITS keywords</a:t>
+              <a:t>GDS listens to</a:t>
+            </a:r>
+            <a:r>
+              <a:rPr lang="en-US" dirty="0" smtClean="0"/>
+              <a:t> Observation Events while the Instrument executes an observation</a:t>
+            </a:r>
+          </a:p>
+          <a:p>
+            <a:r>
+              <a:rPr lang="en-US" dirty="0" smtClean="0"/>
+              <a:t>GDS collects FITS </a:t>
+            </a:r>
+            <a:r>
+              <a:rPr lang="en-US" dirty="0" smtClean="0"/>
+              <a:t>keywords on certain events</a:t>
             </a:r>
           </a:p>
           <a:p>
@@ -5775,8 +5784,8 @@
           </p:cNvPicPr>
           <p:nvPr/>
         </p:nvPicPr>
-        <mc:AlternateContent>
-          <mc:Choice xmlns:ma="http://schemas.microsoft.com/office/mac/drawingml/2008/main" Requires="ma">
+        <mc:AlternateContent xmlns:ma="http://schemas.microsoft.com/office/mac/drawingml/2008/main">
+          <mc:Choice Requires="ma">
             <p:blipFill>
               <a:blip r:embed="rId2"/>
               <a:stretch>
@@ -5784,7 +5793,7 @@
               </a:stretch>
             </p:blipFill>
           </mc:Choice>
-          <mc:Fallback>
+          <mc:Fallback xmlns:p="http://schemas.openxmlformats.org/presentationml/2006/main" xmlns:mv="urn:schemas-microsoft-com:mac:vml" xmlns:mc="http://schemas.openxmlformats.org/markup-compatibility/2006" xmlns:r="http://schemas.openxmlformats.org/officeDocument/2006/relationships" xmlns:a="http://schemas.openxmlformats.org/drawingml/2006/main" xmlns="">
             <p:blipFill>
               <a:blip r:embed="rId3"/>
               <a:stretch>
@@ -5868,7 +5877,19 @@
           <a:p>
             <a:r>
               <a:rPr lang="en-US" dirty="0" smtClean="0"/>
-              <a:t>Instrument writes FITS to GDSN</a:t>
+              <a:t>Instrument writes</a:t>
+            </a:r>
+            <a:r>
+              <a:rPr lang="en-US" dirty="0" smtClean="0"/>
+              <a:t> base FITS </a:t>
+            </a:r>
+            <a:r>
+              <a:rPr lang="en-US" dirty="0" smtClean="0"/>
+              <a:t>to </a:t>
+            </a:r>
+            <a:r>
+              <a:rPr lang="en-US" dirty="0" smtClean="0"/>
+              <a:t>GDSN</a:t>
             </a:r>
           </a:p>
           <a:p>
@@ -5999,7 +6020,11 @@
             </a:r>
             <a:r>
               <a:rPr lang="en-US" dirty="0" smtClean="0"/>
-              <a:t> Generation</a:t>
+              <a:t> </a:t>
+            </a:r>
+            <a:r>
+              <a:rPr lang="en-US" dirty="0" smtClean="0"/>
+              <a:t>Generation Alternatives</a:t>
             </a:r>
             <a:endParaRPr lang="en-US" dirty="0"/>
           </a:p>
@@ -6022,14 +6047,11 @@
           <a:p>
             <a:r>
               <a:rPr lang="en-US" dirty="0" smtClean="0"/>
-              <a:t>Three alternatives</a:t>
-            </a:r>
-          </a:p>
-          <a:p>
-            <a:pPr lvl="1"/>
-            <a:r>
-              <a:rPr lang="en-US" dirty="0" smtClean="0"/>
-              <a:t>Keep current setup assuming DHS supports providing </a:t>
+              <a:t>Keep </a:t>
+            </a:r>
+            <a:r>
+              <a:rPr lang="en-US" dirty="0" smtClean="0"/>
+              <a:t>current setup assuming DHS supports providing </a:t>
             </a:r>
             <a:r>
               <a:rPr lang="en-US" dirty="0" err="1" smtClean="0"/>
@@ -6041,7 +6063,6 @@
             </a:r>
           </a:p>
           <a:p>
-            <a:pPr lvl="1"/>
             <a:r>
               <a:rPr lang="en-US" dirty="0" smtClean="0"/>
               <a:t>Extract common </a:t>
@@ -6056,7 +6077,6 @@
             </a:r>
           </a:p>
           <a:p>
-            <a:pPr lvl="1"/>
             <a:r>
               <a:rPr lang="en-US" dirty="0" smtClean="0"/>
               <a:t>Use independent </a:t>
@@ -6067,11 +6087,7 @@
             </a:r>
             <a:r>
               <a:rPr lang="en-US" dirty="0" smtClean="0"/>
-              <a:t> naming </a:t>
-            </a:r>
-            <a:r>
-              <a:rPr lang="en-US" dirty="0" smtClean="0"/>
-              <a:t>convention</a:t>
+              <a:t> naming convention</a:t>
             </a:r>
             <a:endParaRPr lang="en-US" dirty="0"/>
           </a:p>
@@ -6117,7 +6133,11 @@
           <a:bodyPr/>
           <a:lstStyle/>
           <a:p>
-            <a:endParaRPr lang="en-US"/>
+            <a:r>
+              <a:rPr lang="en-US" dirty="0" smtClean="0"/>
+              <a:t>Current setup</a:t>
+            </a:r>
+            <a:endParaRPr lang="en-US" dirty="0"/>
           </a:p>
         </p:txBody>
       </p:sp>
@@ -6157,7 +6177,7 @@
               </a:stretch>
             </p:blipFill>
           </mc:Choice>
-          <mc:Fallback xmlns:p="http://schemas.openxmlformats.org/presentationml/2006/main" xmlns:mv="urn:schemas-microsoft-com:mac:vml" xmlns:mc="http://schemas.openxmlformats.org/markup-compatibility/2006" xmlns:r="http://schemas.openxmlformats.org/officeDocument/2006/relationships" xmlns:a="http://schemas.openxmlformats.org/drawingml/2006/main" xmlns="">
+          <mc:Fallback xmlns:ma="http://schemas.microsoft.com/office/mac/drawingml/2008/main" xmlns="" xmlns:a="http://schemas.openxmlformats.org/drawingml/2006/main" xmlns:r="http://schemas.openxmlformats.org/officeDocument/2006/relationships" xmlns:mc="http://schemas.openxmlformats.org/markup-compatibility/2006" xmlns:mv="urn:schemas-microsoft-com:mac:vml" xmlns:p="http://schemas.openxmlformats.org/presentationml/2006/main">
             <p:blipFill>
               <a:blip r:embed="rId3"/>
               <a:stretch>
@@ -6216,7 +6236,27 @@
           <a:bodyPr/>
           <a:lstStyle/>
           <a:p>
-            <a:endParaRPr lang="en-US"/>
+            <a:r>
+              <a:rPr lang="en-US" dirty="0" smtClean="0"/>
+              <a:t>Extraction of common </a:t>
+            </a:r>
+            <a:r>
+              <a:rPr lang="en-US" dirty="0" err="1" smtClean="0"/>
+              <a:t>D</a:t>
+            </a:r>
+            <a:r>
+              <a:rPr lang="en-US" dirty="0" err="1" smtClean="0"/>
+              <a:t>ataLabel</a:t>
+            </a:r>
+            <a:r>
+              <a:rPr lang="en-US" dirty="0" smtClean="0"/>
+              <a:t> </a:t>
+            </a:r>
+            <a:r>
+              <a:rPr lang="en-US" dirty="0" smtClean="0"/>
+              <a:t>generator</a:t>
+            </a:r>
+            <a:endParaRPr lang="en-US" dirty="0"/>
           </a:p>
         </p:txBody>
       </p:sp>
@@ -6256,7 +6296,7 @@
               </a:stretch>
             </p:blipFill>
           </mc:Choice>
-          <mc:Fallback xmlns:p="http://schemas.openxmlformats.org/presentationml/2006/main" xmlns:mv="urn:schemas-microsoft-com:mac:vml" xmlns:mc="http://schemas.openxmlformats.org/markup-compatibility/2006" xmlns:r="http://schemas.openxmlformats.org/officeDocument/2006/relationships" xmlns:a="http://schemas.openxmlformats.org/drawingml/2006/main" xmlns="">
+          <mc:Fallback xmlns:ma="http://schemas.microsoft.com/office/mac/drawingml/2008/main" xmlns="" xmlns:a="http://schemas.openxmlformats.org/drawingml/2006/main" xmlns:r="http://schemas.openxmlformats.org/officeDocument/2006/relationships" xmlns:mc="http://schemas.openxmlformats.org/markup-compatibility/2006" xmlns:mv="urn:schemas-microsoft-com:mac:vml" xmlns:p="http://schemas.openxmlformats.org/presentationml/2006/main">
             <p:blipFill>
               <a:blip r:embed="rId3"/>
               <a:stretch>
@@ -6315,7 +6355,11 @@
           <a:bodyPr/>
           <a:lstStyle/>
           <a:p>
-            <a:endParaRPr lang="en-US"/>
+            <a:r>
+              <a:rPr lang="en-US" dirty="0" smtClean="0"/>
+              <a:t>Independent naming</a:t>
+            </a:r>
+            <a:endParaRPr lang="en-US" dirty="0"/>
           </a:p>
         </p:txBody>
       </p:sp>
@@ -6355,7 +6399,7 @@
               </a:stretch>
             </p:blipFill>
           </mc:Choice>
-          <mc:Fallback xmlns:p="http://schemas.openxmlformats.org/presentationml/2006/main" xmlns:mv="urn:schemas-microsoft-com:mac:vml" xmlns:mc="http://schemas.openxmlformats.org/markup-compatibility/2006" xmlns:r="http://schemas.openxmlformats.org/officeDocument/2006/relationships" xmlns:a="http://schemas.openxmlformats.org/drawingml/2006/main" xmlns="">
+          <mc:Fallback xmlns:ma="http://schemas.microsoft.com/office/mac/drawingml/2008/main" xmlns="" xmlns:a="http://schemas.openxmlformats.org/drawingml/2006/main" xmlns:r="http://schemas.openxmlformats.org/officeDocument/2006/relationships" xmlns:mc="http://schemas.openxmlformats.org/markup-compatibility/2006" xmlns:mv="urn:schemas-microsoft-com:mac:vml" xmlns:p="http://schemas.openxmlformats.org/presentationml/2006/main">
             <p:blipFill>
               <a:blip r:embed="rId3"/>
               <a:stretch>
@@ -6401,7 +6445,7 @@
       </p:grpSpPr>
       <p:sp>
         <p:nvSpPr>
-          <p:cNvPr id="2" name="Title 1"/>
+          <p:cNvPr id="4" name="Title 3"/>
           <p:cNvSpPr>
             <a:spLocks noGrp="1"/>
           </p:cNvSpPr>
@@ -6416,55 +6460,31 @@
           <a:p>
             <a:r>
               <a:rPr lang="en-US" dirty="0" smtClean="0"/>
-              <a:t>Keyword configuration in edit mode</a:t>
+              <a:t>User Interface</a:t>
             </a:r>
             <a:endParaRPr lang="en-US" dirty="0"/>
           </a:p>
         </p:txBody>
       </p:sp>
-      <p:pic>
-        <p:nvPicPr>
-          <p:cNvPr id="4" name="Content Placeholder 3"/>
-          <p:cNvPicPr>
-            <a:picLocks noGrp="1"/>
-          </p:cNvPicPr>
-          <p:nvPr>
-            <p:ph idx="1"/>
-          </p:nvPr>
-        </p:nvPicPr>
-        <mc:AlternateContent xmlns:ma="http://schemas.microsoft.com/office/mac/drawingml/2008/main">
-          <mc:Choice Requires="ma">
-            <p:blipFill>
-              <a:blip r:embed="rId2"/>
-              <a:srcRect l="-38405" r="-38405"/>
-              <a:stretch>
-                <a:fillRect/>
-              </a:stretch>
-            </p:blipFill>
-          </mc:Choice>
-          <mc:Fallback xmlns:p="http://schemas.openxmlformats.org/presentationml/2006/main" xmlns:mv="urn:schemas-microsoft-com:mac:vml" xmlns:mc="http://schemas.openxmlformats.org/markup-compatibility/2006" xmlns:r="http://schemas.openxmlformats.org/officeDocument/2006/relationships" xmlns:a="http://schemas.openxmlformats.org/drawingml/2006/main" xmlns="">
-            <p:blipFill>
-              <a:blip r:embed="rId3"/>
-              <a:srcRect l="-38405" r="-38405"/>
-              <a:stretch>
-                <a:fillRect/>
-              </a:stretch>
-            </p:blipFill>
-          </mc:Fallback>
-        </mc:AlternateContent>
-        <p:spPr bwMode="auto">
-          <a:prstGeom prst="rect">
-            <a:avLst/>
-          </a:prstGeom>
-          <a:noFill/>
-          <a:ln w="9525">
-            <a:noFill/>
-            <a:miter lim="800000"/>
-            <a:headEnd/>
-            <a:tailEnd/>
-          </a:ln>
-        </p:spPr>
-      </p:pic>
+      <p:sp>
+        <p:nvSpPr>
+          <p:cNvPr id="5" name="Text Placeholder 4"/>
+          <p:cNvSpPr>
+            <a:spLocks noGrp="1"/>
+          </p:cNvSpPr>
+          <p:nvPr>
+            <p:ph type="body" idx="1"/>
+          </p:nvPr>
+        </p:nvSpPr>
+        <p:spPr/>
+        <p:txBody>
+          <a:bodyPr/>
+          <a:lstStyle/>
+          <a:p>
+            <a:endParaRPr lang="en-US"/>
+          </a:p>
+        </p:txBody>
+      </p:sp>
     </p:spTree>
   </p:cSld>
   <p:clrMapOvr>
@@ -6634,7 +6654,11 @@
           <a:p>
             <a:r>
               <a:rPr lang="en-US" dirty="0" smtClean="0"/>
-              <a:t>Observations are started form </a:t>
+              <a:t>Observations are</a:t>
+            </a:r>
+            <a:r>
+              <a:rPr lang="en-US" dirty="0" smtClean="0"/>
+              <a:t> triggered form </a:t>
             </a:r>
             <a:r>
               <a:rPr lang="en-US" dirty="0" err="1" smtClean="0"/>
@@ -6699,7 +6723,7 @@
           <a:p>
             <a:r>
               <a:rPr lang="en-US" dirty="0" smtClean="0"/>
-              <a:t>Keyword configuration in read-only mode</a:t>
+              <a:t>Keyword configuration in edit mode</a:t>
             </a:r>
             <a:endParaRPr lang="en-US" dirty="0"/>
           </a:p>
@@ -6725,7 +6749,7 @@
               </a:stretch>
             </p:blipFill>
           </mc:Choice>
-          <mc:Fallback xmlns:p="http://schemas.openxmlformats.org/presentationml/2006/main" xmlns:mv="urn:schemas-microsoft-com:mac:vml" xmlns:mc="http://schemas.openxmlformats.org/markup-compatibility/2006" xmlns:r="http://schemas.openxmlformats.org/officeDocument/2006/relationships" xmlns:a="http://schemas.openxmlformats.org/drawingml/2006/main" xmlns="">
+          <mc:Fallback xmlns:ma="http://schemas.microsoft.com/office/mac/drawingml/2008/main" xmlns="" xmlns:a="http://schemas.openxmlformats.org/drawingml/2006/main" xmlns:r="http://schemas.openxmlformats.org/officeDocument/2006/relationships" xmlns:mc="http://schemas.openxmlformats.org/markup-compatibility/2006" xmlns:mv="urn:schemas-microsoft-com:mac:vml" xmlns:p="http://schemas.openxmlformats.org/presentationml/2006/main">
             <p:blipFill>
               <a:blip r:embed="rId3"/>
               <a:srcRect l="-38405" r="-38405"/>
@@ -6736,10 +6760,6 @@
           </mc:Fallback>
         </mc:AlternateContent>
         <p:spPr bwMode="auto">
-          <a:xfrm>
-            <a:off x="779463" y="1828799"/>
-            <a:ext cx="7732082" cy="4352013"/>
-          </a:xfrm>
           <a:prstGeom prst="rect">
             <a:avLst/>
           </a:prstGeom>
@@ -6794,7 +6814,7 @@
           <a:p>
             <a:r>
               <a:rPr lang="en-US" dirty="0" smtClean="0"/>
-              <a:t>System configuration</a:t>
+              <a:t>Keyword configuration in read-only mode</a:t>
             </a:r>
             <a:endParaRPr lang="en-US" dirty="0"/>
           </a:p>
@@ -6820,7 +6840,7 @@
               </a:stretch>
             </p:blipFill>
           </mc:Choice>
-          <mc:Fallback xmlns:p="http://schemas.openxmlformats.org/presentationml/2006/main" xmlns:mv="urn:schemas-microsoft-com:mac:vml" xmlns:mc="http://schemas.openxmlformats.org/markup-compatibility/2006" xmlns:r="http://schemas.openxmlformats.org/officeDocument/2006/relationships" xmlns:a="http://schemas.openxmlformats.org/drawingml/2006/main" xmlns="">
+          <mc:Fallback xmlns:ma="http://schemas.microsoft.com/office/mac/drawingml/2008/main" xmlns="" xmlns:a="http://schemas.openxmlformats.org/drawingml/2006/main" xmlns:r="http://schemas.openxmlformats.org/officeDocument/2006/relationships" xmlns:mc="http://schemas.openxmlformats.org/markup-compatibility/2006" xmlns:mv="urn:schemas-microsoft-com:mac:vml" xmlns:p="http://schemas.openxmlformats.org/presentationml/2006/main">
             <p:blipFill>
               <a:blip r:embed="rId3"/>
               <a:srcRect l="-38405" r="-38405"/>
@@ -6832,8 +6852,8 @@
         </mc:AlternateContent>
         <p:spPr bwMode="auto">
           <a:xfrm>
-            <a:off x="779463" y="1558590"/>
-            <a:ext cx="7913007" cy="4479140"/>
+            <a:off x="779463" y="1828799"/>
+            <a:ext cx="7732082" cy="4352013"/>
           </a:xfrm>
           <a:prstGeom prst="rect">
             <a:avLst/>
@@ -6889,7 +6909,7 @@
           <a:p>
             <a:r>
               <a:rPr lang="en-US" dirty="0" smtClean="0"/>
-              <a:t>GDS Status</a:t>
+              <a:t>System configuration</a:t>
             </a:r>
             <a:endParaRPr lang="en-US" dirty="0"/>
           </a:p>
@@ -6909,16 +6929,16 @@
           <mc:Choice Requires="ma">
             <p:blipFill>
               <a:blip r:embed="rId2"/>
-              <a:srcRect l="-37492" r="-37492"/>
+              <a:srcRect l="-38405" r="-38405"/>
               <a:stretch>
                 <a:fillRect/>
               </a:stretch>
             </p:blipFill>
           </mc:Choice>
-          <mc:Fallback xmlns:p="http://schemas.openxmlformats.org/presentationml/2006/main" xmlns:mv="urn:schemas-microsoft-com:mac:vml" xmlns:mc="http://schemas.openxmlformats.org/markup-compatibility/2006" xmlns:r="http://schemas.openxmlformats.org/officeDocument/2006/relationships" xmlns:a="http://schemas.openxmlformats.org/drawingml/2006/main" xmlns="">
+          <mc:Fallback xmlns:ma="http://schemas.microsoft.com/office/mac/drawingml/2008/main" xmlns="" xmlns:a="http://schemas.openxmlformats.org/drawingml/2006/main" xmlns:r="http://schemas.openxmlformats.org/officeDocument/2006/relationships" xmlns:mc="http://schemas.openxmlformats.org/markup-compatibility/2006" xmlns:mv="urn:schemas-microsoft-com:mac:vml" xmlns:p="http://schemas.openxmlformats.org/presentationml/2006/main">
             <p:blipFill>
               <a:blip r:embed="rId3"/>
-              <a:srcRect l="-37492" r="-37492"/>
+              <a:srcRect l="-38405" r="-38405"/>
               <a:stretch>
                 <a:fillRect/>
               </a:stretch>
@@ -6927,8 +6947,8 @@
         </mc:AlternateContent>
         <p:spPr bwMode="auto">
           <a:xfrm>
-            <a:off x="346379" y="1558590"/>
-            <a:ext cx="8016571" cy="4479140"/>
+            <a:off x="779463" y="1558590"/>
+            <a:ext cx="7913007" cy="4479140"/>
           </a:xfrm>
           <a:prstGeom prst="rect">
             <a:avLst/>
@@ -6984,7 +7004,7 @@
           <a:p>
             <a:r>
               <a:rPr lang="en-US" dirty="0" smtClean="0"/>
-              <a:t>GDS Log</a:t>
+              <a:t>GDS Status</a:t>
             </a:r>
             <a:endParaRPr lang="en-US" dirty="0"/>
           </a:p>
@@ -7004,16 +7024,16 @@
           <mc:Choice Requires="ma">
             <p:blipFill>
               <a:blip r:embed="rId2"/>
-              <a:srcRect l="-37470" r="-37470"/>
+              <a:srcRect l="-37492" r="-37492"/>
               <a:stretch>
                 <a:fillRect/>
               </a:stretch>
             </p:blipFill>
           </mc:Choice>
-          <mc:Fallback xmlns:p="http://schemas.openxmlformats.org/presentationml/2006/main" xmlns:mv="urn:schemas-microsoft-com:mac:vml" xmlns:mc="http://schemas.openxmlformats.org/markup-compatibility/2006" xmlns:r="http://schemas.openxmlformats.org/officeDocument/2006/relationships" xmlns:a="http://schemas.openxmlformats.org/drawingml/2006/main" xmlns="">
+          <mc:Fallback xmlns:ma="http://schemas.microsoft.com/office/mac/drawingml/2008/main" xmlns="" xmlns:a="http://schemas.openxmlformats.org/drawingml/2006/main" xmlns:r="http://schemas.openxmlformats.org/officeDocument/2006/relationships" xmlns:mc="http://schemas.openxmlformats.org/markup-compatibility/2006" xmlns:mv="urn:schemas-microsoft-com:mac:vml" xmlns:p="http://schemas.openxmlformats.org/presentationml/2006/main">
             <p:blipFill>
               <a:blip r:embed="rId3"/>
-              <a:srcRect l="-37470" r="-37470"/>
+              <a:srcRect l="-37492" r="-37492"/>
               <a:stretch>
                 <a:fillRect/>
               </a:stretch>
@@ -7022,8 +7042,8 @@
         </mc:AlternateContent>
         <p:spPr bwMode="auto">
           <a:xfrm>
-            <a:off x="470087" y="1533850"/>
-            <a:ext cx="7892864" cy="4503880"/>
+            <a:off x="346379" y="1558590"/>
+            <a:ext cx="8016571" cy="4479140"/>
           </a:xfrm>
           <a:prstGeom prst="rect">
             <a:avLst/>
@@ -7079,53 +7099,59 @@
           <a:p>
             <a:r>
               <a:rPr lang="en-US" dirty="0" smtClean="0"/>
-              <a:t>Operational Aspects</a:t>
+              <a:t>GDS Log</a:t>
             </a:r>
             <a:endParaRPr lang="en-US" dirty="0"/>
           </a:p>
         </p:txBody>
       </p:sp>
-      <p:sp>
-        <p:nvSpPr>
-          <p:cNvPr id="3" name="Content Placeholder 2"/>
-          <p:cNvSpPr>
-            <a:spLocks noGrp="1"/>
-          </p:cNvSpPr>
+      <p:pic>
+        <p:nvPicPr>
+          <p:cNvPr id="4" name="Content Placeholder 3"/>
+          <p:cNvPicPr>
+            <a:picLocks noGrp="1"/>
+          </p:cNvPicPr>
           <p:nvPr>
             <p:ph idx="1"/>
           </p:nvPr>
-        </p:nvSpPr>
-        <p:spPr/>
-        <p:txBody>
-          <a:bodyPr/>
-          <a:lstStyle/>
-          <a:p>
-            <a:r>
-              <a:rPr lang="en-US" dirty="0" smtClean="0"/>
-              <a:t>Startup/Shutdown Procedure</a:t>
-            </a:r>
-          </a:p>
-          <a:p>
-            <a:r>
-              <a:rPr lang="en-US" dirty="0" smtClean="0"/>
-              <a:t>Logging</a:t>
-            </a:r>
-          </a:p>
-          <a:p>
-            <a:r>
-              <a:rPr lang="en-US" dirty="0" smtClean="0"/>
-              <a:t>Troubleshooting</a:t>
-            </a:r>
-          </a:p>
-          <a:p>
-            <a:r>
-              <a:rPr lang="en-US" dirty="0" smtClean="0"/>
-              <a:t>Heartbeat and status</a:t>
-            </a:r>
-            <a:endParaRPr lang="en-US" dirty="0"/>
-          </a:p>
-        </p:txBody>
-      </p:sp>
+        </p:nvPicPr>
+        <mc:AlternateContent xmlns:ma="http://schemas.microsoft.com/office/mac/drawingml/2008/main">
+          <mc:Choice Requires="ma">
+            <p:blipFill>
+              <a:blip r:embed="rId2"/>
+              <a:srcRect l="-37470" r="-37470"/>
+              <a:stretch>
+                <a:fillRect/>
+              </a:stretch>
+            </p:blipFill>
+          </mc:Choice>
+          <mc:Fallback xmlns:ma="http://schemas.microsoft.com/office/mac/drawingml/2008/main" xmlns="" xmlns:a="http://schemas.openxmlformats.org/drawingml/2006/main" xmlns:r="http://schemas.openxmlformats.org/officeDocument/2006/relationships" xmlns:mc="http://schemas.openxmlformats.org/markup-compatibility/2006" xmlns:mv="urn:schemas-microsoft-com:mac:vml" xmlns:p="http://schemas.openxmlformats.org/presentationml/2006/main">
+            <p:blipFill>
+              <a:blip r:embed="rId3"/>
+              <a:srcRect l="-37470" r="-37470"/>
+              <a:stretch>
+                <a:fillRect/>
+              </a:stretch>
+            </p:blipFill>
+          </mc:Fallback>
+        </mc:AlternateContent>
+        <p:spPr bwMode="auto">
+          <a:xfrm>
+            <a:off x="470087" y="1533850"/>
+            <a:ext cx="7892864" cy="4503880"/>
+          </a:xfrm>
+          <a:prstGeom prst="rect">
+            <a:avLst/>
+          </a:prstGeom>
+          <a:noFill/>
+          <a:ln w="9525">
+            <a:noFill/>
+            <a:miter lim="800000"/>
+            <a:headEnd/>
+            <a:tailEnd/>
+          </a:ln>
+        </p:spPr>
+      </p:pic>
     </p:spTree>
   </p:cSld>
   <p:clrMapOvr>
@@ -7168,6 +7194,95 @@
           <a:p>
             <a:r>
               <a:rPr lang="en-US" dirty="0" smtClean="0"/>
+              <a:t>Operational Aspects</a:t>
+            </a:r>
+            <a:endParaRPr lang="en-US" dirty="0"/>
+          </a:p>
+        </p:txBody>
+      </p:sp>
+      <p:sp>
+        <p:nvSpPr>
+          <p:cNvPr id="3" name="Content Placeholder 2"/>
+          <p:cNvSpPr>
+            <a:spLocks noGrp="1"/>
+          </p:cNvSpPr>
+          <p:nvPr>
+            <p:ph idx="1"/>
+          </p:nvPr>
+        </p:nvSpPr>
+        <p:spPr/>
+        <p:txBody>
+          <a:bodyPr/>
+          <a:lstStyle/>
+          <a:p>
+            <a:r>
+              <a:rPr lang="en-US" dirty="0" smtClean="0"/>
+              <a:t>Startup/Shutdown Procedure</a:t>
+            </a:r>
+          </a:p>
+          <a:p>
+            <a:r>
+              <a:rPr lang="en-US" dirty="0" smtClean="0"/>
+              <a:t>Logging</a:t>
+            </a:r>
+          </a:p>
+          <a:p>
+            <a:r>
+              <a:rPr lang="en-US" dirty="0" smtClean="0"/>
+              <a:t>Troubleshooting</a:t>
+            </a:r>
+          </a:p>
+          <a:p>
+            <a:r>
+              <a:rPr lang="en-US" dirty="0" smtClean="0"/>
+              <a:t>Heartbeat and status</a:t>
+            </a:r>
+            <a:endParaRPr lang="en-US" dirty="0"/>
+          </a:p>
+        </p:txBody>
+      </p:sp>
+    </p:spTree>
+  </p:cSld>
+  <p:clrMapOvr>
+    <a:masterClrMapping/>
+  </p:clrMapOvr>
+</p:sld>
+</file>
+
+<file path=ppt/slides/slide27.xml><?xml version="1.0" encoding="utf-8"?>
+<p:sld xmlns:a="http://schemas.openxmlformats.org/drawingml/2006/main" xmlns:r="http://schemas.openxmlformats.org/officeDocument/2006/relationships" xmlns:mc="http://schemas.openxmlformats.org/markup-compatibility/2006" xmlns:mv="urn:schemas-microsoft-com:mac:vml" xmlns:p="http://schemas.openxmlformats.org/presentationml/2006/main" mc:Ignorable="mv" mc:PreserveAttributes="mv:*">
+  <p:cSld>
+    <p:spTree>
+      <p:nvGrpSpPr>
+        <p:cNvPr id="1" name=""/>
+        <p:cNvGrpSpPr/>
+        <p:nvPr/>
+      </p:nvGrpSpPr>
+      <p:grpSpPr>
+        <a:xfrm>
+          <a:off x="0" y="0"/>
+          <a:ext cx="0" cy="0"/>
+          <a:chOff x="0" y="0"/>
+          <a:chExt cx="0" cy="0"/>
+        </a:xfrm>
+      </p:grpSpPr>
+      <p:sp>
+        <p:nvSpPr>
+          <p:cNvPr id="2" name="Title 1"/>
+          <p:cNvSpPr>
+            <a:spLocks noGrp="1"/>
+          </p:cNvSpPr>
+          <p:nvPr>
+            <p:ph type="title"/>
+          </p:nvPr>
+        </p:nvSpPr>
+        <p:spPr/>
+        <p:txBody>
+          <a:bodyPr/>
+          <a:lstStyle/>
+          <a:p>
+            <a:r>
+              <a:rPr lang="en-US" dirty="0" smtClean="0"/>
               <a:t>Protocols</a:t>
             </a:r>
             <a:endParaRPr lang="en-US" dirty="0"/>
@@ -7236,7 +7351,7 @@
               </a:stretch>
             </p:blipFill>
           </mc:Choice>
-          <mc:Fallback xmlns:p="http://schemas.openxmlformats.org/presentationml/2006/main" xmlns:mv="urn:schemas-microsoft-com:mac:vml" xmlns:mc="http://schemas.openxmlformats.org/markup-compatibility/2006" xmlns:r="http://schemas.openxmlformats.org/officeDocument/2006/relationships" xmlns:a="http://schemas.openxmlformats.org/drawingml/2006/main" xmlns="">
+          <mc:Fallback xmlns:ma="http://schemas.microsoft.com/office/mac/drawingml/2008/main" xmlns="" xmlns:a="http://schemas.openxmlformats.org/drawingml/2006/main" xmlns:r="http://schemas.openxmlformats.org/officeDocument/2006/relationships" xmlns:mc="http://schemas.openxmlformats.org/markup-compatibility/2006" xmlns:mv="urn:schemas-microsoft-com:mac:vml" xmlns:p="http://schemas.openxmlformats.org/presentationml/2006/main">
             <p:blipFill>
               <a:blip r:embed="rId3"/>
               <a:stretch>
@@ -7263,109 +7378,6 @@
 </p:sld>
 </file>
 
-<file path=ppt/slides/slide27.xml><?xml version="1.0" encoding="utf-8"?>
-<p:sld xmlns:a="http://schemas.openxmlformats.org/drawingml/2006/main" xmlns:r="http://schemas.openxmlformats.org/officeDocument/2006/relationships" xmlns:mc="http://schemas.openxmlformats.org/markup-compatibility/2006" xmlns:mv="urn:schemas-microsoft-com:mac:vml" xmlns:p="http://schemas.openxmlformats.org/presentationml/2006/main" mc:Ignorable="mv" mc:PreserveAttributes="mv:*">
-  <p:cSld>
-    <p:spTree>
-      <p:nvGrpSpPr>
-        <p:cNvPr id="1" name=""/>
-        <p:cNvGrpSpPr/>
-        <p:nvPr/>
-      </p:nvGrpSpPr>
-      <p:grpSpPr>
-        <a:xfrm>
-          <a:off x="0" y="0"/>
-          <a:ext cx="0" cy="0"/>
-          <a:chOff x="0" y="0"/>
-          <a:chExt cx="0" cy="0"/>
-        </a:xfrm>
-      </p:grpSpPr>
-      <p:sp>
-        <p:nvSpPr>
-          <p:cNvPr id="2" name="Title 1"/>
-          <p:cNvSpPr>
-            <a:spLocks noGrp="1"/>
-          </p:cNvSpPr>
-          <p:nvPr>
-            <p:ph type="title"/>
-          </p:nvPr>
-        </p:nvSpPr>
-        <p:spPr/>
-        <p:txBody>
-          <a:bodyPr/>
-          <a:lstStyle/>
-          <a:p>
-            <a:r>
-              <a:rPr lang="en-US" dirty="0" err="1" smtClean="0"/>
-              <a:t>Scala</a:t>
-            </a:r>
-            <a:endParaRPr lang="en-US" dirty="0"/>
-          </a:p>
-        </p:txBody>
-      </p:sp>
-      <p:sp>
-        <p:nvSpPr>
-          <p:cNvPr id="3" name="Content Placeholder 2"/>
-          <p:cNvSpPr>
-            <a:spLocks noGrp="1"/>
-          </p:cNvSpPr>
-          <p:nvPr>
-            <p:ph idx="1"/>
-          </p:nvPr>
-        </p:nvSpPr>
-        <p:spPr/>
-        <p:txBody>
-          <a:bodyPr/>
-          <a:lstStyle/>
-          <a:p>
-            <a:pPr lvl="0"/>
-            <a:r>
-              <a:rPr lang="en-US" dirty="0" smtClean="0"/>
-              <a:t>Compiles to </a:t>
-            </a:r>
-            <a:r>
-              <a:rPr lang="en-US" dirty="0" err="1" smtClean="0"/>
-              <a:t>bytecode</a:t>
-            </a:r>
-            <a:r>
-              <a:rPr lang="en-US" dirty="0" smtClean="0"/>
-              <a:t>, runs on a standard JVM and transparently interoperates with Java.</a:t>
-            </a:r>
-          </a:p>
-          <a:p>
-            <a:pPr lvl="0"/>
-            <a:r>
-              <a:rPr lang="en-US" dirty="0" smtClean="0"/>
-              <a:t>Statically typed combined with a type inference mechanism.</a:t>
-            </a:r>
-          </a:p>
-          <a:p>
-            <a:pPr lvl="0"/>
-            <a:r>
-              <a:rPr lang="en-US" dirty="0" smtClean="0"/>
-              <a:t>Combination of functional and object-oriented paradigms.</a:t>
-            </a:r>
-          </a:p>
-          <a:p>
-            <a:pPr lvl="0"/>
-            <a:r>
-              <a:rPr lang="en-US" dirty="0" smtClean="0"/>
-              <a:t>The actor concurrency model provides a safe way to build concurrent applications that scale easily.</a:t>
-            </a:r>
-          </a:p>
-          <a:p>
-            <a:endParaRPr lang="en-US" dirty="0"/>
-          </a:p>
-        </p:txBody>
-      </p:sp>
-    </p:spTree>
-  </p:cSld>
-  <p:clrMapOvr>
-    <a:masterClrMapping/>
-  </p:clrMapOvr>
-</p:sld>
-</file>
-
 <file path=ppt/slides/slide28.xml><?xml version="1.0" encoding="utf-8"?>
 <p:sld xmlns:a="http://schemas.openxmlformats.org/drawingml/2006/main" xmlns:r="http://schemas.openxmlformats.org/officeDocument/2006/relationships" xmlns:mc="http://schemas.openxmlformats.org/markup-compatibility/2006" xmlns:mv="urn:schemas-microsoft-com:mac:vml" xmlns:p="http://schemas.openxmlformats.org/presentationml/2006/main" mc:Ignorable="mv" mc:PreserveAttributes="mv:*">
   <p:cSld>
@@ -7399,6 +7411,109 @@
           <a:lstStyle/>
           <a:p>
             <a:r>
+              <a:rPr lang="en-US" dirty="0" err="1" smtClean="0"/>
+              <a:t>Scala</a:t>
+            </a:r>
+            <a:endParaRPr lang="en-US" dirty="0"/>
+          </a:p>
+        </p:txBody>
+      </p:sp>
+      <p:sp>
+        <p:nvSpPr>
+          <p:cNvPr id="3" name="Content Placeholder 2"/>
+          <p:cNvSpPr>
+            <a:spLocks noGrp="1"/>
+          </p:cNvSpPr>
+          <p:nvPr>
+            <p:ph idx="1"/>
+          </p:nvPr>
+        </p:nvSpPr>
+        <p:spPr/>
+        <p:txBody>
+          <a:bodyPr/>
+          <a:lstStyle/>
+          <a:p>
+            <a:pPr lvl="0"/>
+            <a:r>
+              <a:rPr lang="en-US" dirty="0" smtClean="0"/>
+              <a:t>Compiles to </a:t>
+            </a:r>
+            <a:r>
+              <a:rPr lang="en-US" dirty="0" err="1" smtClean="0"/>
+              <a:t>bytecode</a:t>
+            </a:r>
+            <a:r>
+              <a:rPr lang="en-US" dirty="0" smtClean="0"/>
+              <a:t>, runs on a standard JVM and transparently interoperates with Java.</a:t>
+            </a:r>
+          </a:p>
+          <a:p>
+            <a:pPr lvl="0"/>
+            <a:r>
+              <a:rPr lang="en-US" dirty="0" smtClean="0"/>
+              <a:t>Statically typed combined with a type inference mechanism.</a:t>
+            </a:r>
+          </a:p>
+          <a:p>
+            <a:pPr lvl="0"/>
+            <a:r>
+              <a:rPr lang="en-US" dirty="0" smtClean="0"/>
+              <a:t>Combination of functional and object-oriented paradigms.</a:t>
+            </a:r>
+          </a:p>
+          <a:p>
+            <a:pPr lvl="0"/>
+            <a:r>
+              <a:rPr lang="en-US" dirty="0" smtClean="0"/>
+              <a:t>The actor concurrency model provides a safe way to build concurrent applications that scale easily.</a:t>
+            </a:r>
+          </a:p>
+          <a:p>
+            <a:endParaRPr lang="en-US" dirty="0"/>
+          </a:p>
+        </p:txBody>
+      </p:sp>
+    </p:spTree>
+  </p:cSld>
+  <p:clrMapOvr>
+    <a:masterClrMapping/>
+  </p:clrMapOvr>
+</p:sld>
+</file>
+
+<file path=ppt/slides/slide29.xml><?xml version="1.0" encoding="utf-8"?>
+<p:sld xmlns:a="http://schemas.openxmlformats.org/drawingml/2006/main" xmlns:r="http://schemas.openxmlformats.org/officeDocument/2006/relationships" xmlns:mc="http://schemas.openxmlformats.org/markup-compatibility/2006" xmlns:mv="urn:schemas-microsoft-com:mac:vml" xmlns:p="http://schemas.openxmlformats.org/presentationml/2006/main" mc:Ignorable="mv" mc:PreserveAttributes="mv:*">
+  <p:cSld>
+    <p:spTree>
+      <p:nvGrpSpPr>
+        <p:cNvPr id="1" name=""/>
+        <p:cNvGrpSpPr/>
+        <p:nvPr/>
+      </p:nvGrpSpPr>
+      <p:grpSpPr>
+        <a:xfrm>
+          <a:off x="0" y="0"/>
+          <a:ext cx="0" cy="0"/>
+          <a:chOff x="0" y="0"/>
+          <a:chExt cx="0" cy="0"/>
+        </a:xfrm>
+      </p:grpSpPr>
+      <p:sp>
+        <p:nvSpPr>
+          <p:cNvPr id="2" name="Title 1"/>
+          <p:cNvSpPr>
+            <a:spLocks noGrp="1"/>
+          </p:cNvSpPr>
+          <p:nvPr>
+            <p:ph type="title"/>
+          </p:nvPr>
+        </p:nvSpPr>
+        <p:spPr/>
+        <p:txBody>
+          <a:bodyPr/>
+          <a:lstStyle/>
+          <a:p>
+            <a:r>
               <a:rPr lang="en-US" dirty="0" smtClean="0"/>
               <a:t>Observation Sequence in Detail</a:t>
             </a:r>
@@ -7423,7 +7538,7 @@
               </a:stretch>
             </p:blipFill>
           </mc:Choice>
-          <mc:Fallback xmlns:p="http://schemas.openxmlformats.org/presentationml/2006/main" xmlns:mv="urn:schemas-microsoft-com:mac:vml" xmlns:mc="http://schemas.openxmlformats.org/markup-compatibility/2006" xmlns:r="http://schemas.openxmlformats.org/officeDocument/2006/relationships" xmlns:a="http://schemas.openxmlformats.org/drawingml/2006/main" xmlns="">
+          <mc:Fallback xmlns:ma="http://schemas.microsoft.com/office/mac/drawingml/2008/main" xmlns="" xmlns:a="http://schemas.openxmlformats.org/drawingml/2006/main" xmlns:r="http://schemas.openxmlformats.org/officeDocument/2006/relationships" xmlns:mc="http://schemas.openxmlformats.org/markup-compatibility/2006" xmlns:mv="urn:schemas-microsoft-com:mac:vml" xmlns:p="http://schemas.openxmlformats.org/presentationml/2006/main">
             <p:blipFill>
               <a:blip r:embed="rId3"/>
               <a:stretch>
@@ -7577,13 +7692,25 @@
             <a:pPr lvl="0"/>
             <a:r>
               <a:rPr lang="en-US" dirty="0" smtClean="0"/>
-              <a:t>GIAPI based instruments write standard FITS files with a basic set of keywords</a:t>
-            </a:r>
-          </a:p>
-          <a:p>
-            <a:r>
-              <a:rPr lang="en-US" dirty="0" smtClean="0"/>
-              <a:t>GDS completes the FITS files with values collected during an observation</a:t>
+              <a:t>GIAPI-based </a:t>
+            </a:r>
+            <a:r>
+              <a:rPr lang="en-US" dirty="0" smtClean="0"/>
+              <a:t>instruments write standard FITS files with a basic set of keywords</a:t>
+            </a:r>
+          </a:p>
+          <a:p>
+            <a:r>
+              <a:rPr lang="en-US" dirty="0" smtClean="0"/>
+              <a:t>GDS completes </a:t>
+            </a:r>
+            <a:r>
+              <a:rPr lang="en-US" dirty="0" smtClean="0"/>
+              <a:t>those </a:t>
+            </a:r>
+            <a:r>
+              <a:rPr lang="en-US" dirty="0" smtClean="0"/>
+              <a:t>FITS files with values collected during an observation</a:t>
             </a:r>
           </a:p>
           <a:p>
@@ -7676,8 +7803,8 @@
           </p:cNvPicPr>
           <p:nvPr/>
         </p:nvPicPr>
-        <mc:AlternateContent>
-          <mc:Choice xmlns:ma="http://schemas.microsoft.com/office/mac/drawingml/2008/main" Requires="ma">
+        <mc:AlternateContent xmlns:ma="http://schemas.microsoft.com/office/mac/drawingml/2008/main">
+          <mc:Choice Requires="ma">
             <p:blipFill>
               <a:blip r:embed="rId2"/>
               <a:stretch>
@@ -7685,7 +7812,7 @@
               </a:stretch>
             </p:blipFill>
           </mc:Choice>
-          <mc:Fallback>
+          <mc:Fallback xmlns:p="http://schemas.openxmlformats.org/presentationml/2006/main" xmlns:mv="urn:schemas-microsoft-com:mac:vml" xmlns:mc="http://schemas.openxmlformats.org/markup-compatibility/2006" xmlns:r="http://schemas.openxmlformats.org/officeDocument/2006/relationships" xmlns:a="http://schemas.openxmlformats.org/drawingml/2006/main" xmlns="">
             <p:blipFill>
               <a:blip r:embed="rId3"/>
               <a:stretch>
@@ -7760,8 +7887,8 @@
           </p:cNvPicPr>
           <p:nvPr/>
         </p:nvPicPr>
-        <mc:AlternateContent>
-          <mc:Choice xmlns:ma="http://schemas.microsoft.com/office/mac/drawingml/2008/main" Requires="ma">
+        <mc:AlternateContent xmlns:ma="http://schemas.microsoft.com/office/mac/drawingml/2008/main">
+          <mc:Choice Requires="ma">
             <p:blipFill>
               <a:blip r:embed="rId2"/>
               <a:stretch>
@@ -7769,7 +7896,7 @@
               </a:stretch>
             </p:blipFill>
           </mc:Choice>
-          <mc:Fallback>
+          <mc:Fallback xmlns:p="http://schemas.openxmlformats.org/presentationml/2006/main" xmlns:mv="urn:schemas-microsoft-com:mac:vml" xmlns:mc="http://schemas.openxmlformats.org/markup-compatibility/2006" xmlns:r="http://schemas.openxmlformats.org/officeDocument/2006/relationships" xmlns:a="http://schemas.openxmlformats.org/drawingml/2006/main" xmlns="">
             <p:blipFill>
               <a:blip r:embed="rId3"/>
               <a:stretch>
@@ -7844,8 +7971,8 @@
           </p:cNvPicPr>
           <p:nvPr/>
         </p:nvPicPr>
-        <mc:AlternateContent>
-          <mc:Choice xmlns:ma="http://schemas.microsoft.com/office/mac/drawingml/2008/main" Requires="ma">
+        <mc:AlternateContent xmlns:ma="http://schemas.microsoft.com/office/mac/drawingml/2008/main">
+          <mc:Choice Requires="ma">
             <p:blipFill>
               <a:blip r:embed="rId2"/>
               <a:stretch>
@@ -7853,7 +7980,7 @@
               </a:stretch>
             </p:blipFill>
           </mc:Choice>
-          <mc:Fallback>
+          <mc:Fallback xmlns:p="http://schemas.openxmlformats.org/presentationml/2006/main" xmlns:mv="urn:schemas-microsoft-com:mac:vml" xmlns:mc="http://schemas.openxmlformats.org/markup-compatibility/2006" xmlns:r="http://schemas.openxmlformats.org/officeDocument/2006/relationships" xmlns:a="http://schemas.openxmlformats.org/drawingml/2006/main" xmlns="">
             <p:blipFill>
               <a:blip r:embed="rId3"/>
               <a:stretch>
@@ -7937,7 +8064,11 @@
           <a:p>
             <a:r>
               <a:rPr lang="en-US" dirty="0" smtClean="0"/>
-              <a:t>User initiates an observe through the </a:t>
+              <a:t>User</a:t>
+            </a:r>
+            <a:r>
+              <a:rPr lang="en-US" dirty="0" smtClean="0"/>
+              <a:t> signals an observation on </a:t>
             </a:r>
             <a:r>
               <a:rPr lang="en-US" dirty="0" err="1" smtClean="0"/>
@@ -7952,7 +8083,11 @@
             </a:r>
             <a:r>
               <a:rPr lang="en-US" dirty="0" smtClean="0"/>
-              <a:t> gets </a:t>
+              <a:t> gets</a:t>
+            </a:r>
+            <a:r>
+              <a:rPr lang="en-US" dirty="0" smtClean="0"/>
+              <a:t> a </a:t>
             </a:r>
             <a:r>
               <a:rPr lang="en-US" dirty="0" err="1" smtClean="0"/>
@@ -7960,7 +8095,11 @@
             </a:r>
             <a:r>
               <a:rPr lang="en-US" dirty="0" smtClean="0"/>
-              <a:t> for the observation’s </a:t>
+              <a:t> </a:t>
+            </a:r>
+            <a:r>
+              <a:rPr lang="en-US" dirty="0" smtClean="0"/>
+              <a:t>for the observation’s </a:t>
             </a:r>
             <a:r>
               <a:rPr lang="en-US" dirty="0" err="1" smtClean="0"/>
@@ -7993,7 +8132,19 @@
             </a:r>
             <a:r>
               <a:rPr lang="en-US" dirty="0" smtClean="0"/>
-              <a:t> can send FITS keywords for the current observation to the GDS</a:t>
+              <a:t> may </a:t>
+            </a:r>
+            <a:r>
+              <a:rPr lang="en-US" dirty="0" err="1" smtClean="0"/>
+              <a:t>alos</a:t>
+            </a:r>
+            <a:r>
+              <a:rPr lang="en-US" dirty="0" smtClean="0"/>
+              <a:t> </a:t>
+            </a:r>
+            <a:r>
+              <a:rPr lang="en-US" dirty="0" smtClean="0"/>
+              <a:t>send FITS keywords for the current observation to the GDS</a:t>
             </a:r>
           </a:p>
           <a:p>
@@ -8074,60 +8225,525 @@
         <p:spPr/>
         <p:txBody>
           <a:bodyPr>
-            <a:normAutofit fontScale="92500" lnSpcReduction="20000"/>
+            <a:normAutofit/>
           </a:bodyPr>
           <a:lstStyle/>
           <a:p>
             <a:r>
               <a:rPr lang="en-US" dirty="0" smtClean="0"/>
-              <a:t>During the observation the instrument publishes the following observation events</a:t>
-            </a:r>
-          </a:p>
-          <a:p>
-            <a:r>
-              <a:rPr lang="en-US" dirty="0" smtClean="0"/>
-              <a:t>OBS_PREP</a:t>
-            </a:r>
-          </a:p>
-          <a:p>
-            <a:r>
-              <a:rPr lang="en-US" dirty="0" smtClean="0"/>
-              <a:t>OBS_START_ACQ</a:t>
-            </a:r>
-          </a:p>
-          <a:p>
-            <a:r>
-              <a:rPr lang="en-US" dirty="0" smtClean="0"/>
-              <a:t>OBS_END_ACQ</a:t>
-            </a:r>
-          </a:p>
-          <a:p>
-            <a:r>
-              <a:rPr lang="en-US" dirty="0" smtClean="0"/>
-              <a:t>OBS_START_READOUT</a:t>
-            </a:r>
-          </a:p>
-          <a:p>
-            <a:r>
-              <a:rPr lang="en-US" dirty="0" smtClean="0"/>
-              <a:t>OBS_END_READOUT</a:t>
-            </a:r>
-          </a:p>
-          <a:p>
-            <a:r>
-              <a:rPr lang="en-US" dirty="0" smtClean="0"/>
-              <a:t>OBS_START_DSET_WRITE</a:t>
-            </a:r>
-          </a:p>
-          <a:p>
-            <a:r>
-              <a:rPr lang="en-US" dirty="0" smtClean="0"/>
-              <a:t>OBS_END_DSET_WRITE</a:t>
-            </a:r>
-            <a:endParaRPr lang="en-US" dirty="0"/>
-          </a:p>
-        </p:txBody>
-      </p:sp>
+              <a:t>During the observation the instrument publishes the following observation </a:t>
+            </a:r>
+            <a:r>
+              <a:rPr lang="en-US" dirty="0" smtClean="0"/>
+              <a:t>events</a:t>
+            </a:r>
+          </a:p>
+          <a:p>
+            <a:endParaRPr lang="en-US" dirty="0" smtClean="0"/>
+          </a:p>
+        </p:txBody>
+      </p:sp>
+      <p:graphicFrame>
+        <p:nvGraphicFramePr>
+          <p:cNvPr id="5" name="Table 4"/>
+          <p:cNvGraphicFramePr>
+            <a:graphicFrameLocks noGrp="1"/>
+          </p:cNvGraphicFramePr>
+          <p:nvPr/>
+        </p:nvGraphicFramePr>
+        <p:xfrm>
+          <a:off x="1013277" y="2769543"/>
+          <a:ext cx="6748440" cy="3742261"/>
+        </p:xfrm>
+        <a:graphic>
+          <a:graphicData uri="http://schemas.openxmlformats.org/drawingml/2006/table">
+            <a:tbl>
+              <a:tblPr firstRow="1" bandRow="1">
+                <a:tableStyleId>{5C22544A-7EE6-4342-B048-85BDC9FD1C3A}</a:tableStyleId>
+              </a:tblPr>
+              <a:tblGrid>
+                <a:gridCol w="1715822"/>
+                <a:gridCol w="3012816"/>
+                <a:gridCol w="2019802"/>
+              </a:tblGrid>
+              <a:tr h="475221">
+                <a:tc>
+                  <a:txBody>
+                    <a:bodyPr/>
+                    <a:lstStyle/>
+                    <a:p>
+                      <a:pPr marL="0" marR="0" algn="ctr">
+                        <a:spcBef>
+                          <a:spcPts val="200"/>
+                        </a:spcBef>
+                        <a:spcAft>
+                          <a:spcPts val="200"/>
+                        </a:spcAft>
+                      </a:pPr>
+                      <a:r>
+                        <a:rPr lang="en-US" sz="1800" b="1" dirty="0" smtClean="0">
+                          <a:latin typeface="Trebuchet MS"/>
+                          <a:ea typeface="Times New Roman"/>
+                          <a:cs typeface="Trebuchet MS"/>
+                        </a:rPr>
+                        <a:t>Event Time</a:t>
+                      </a:r>
+                      <a:endParaRPr lang="en-US" sz="1800" dirty="0">
+                        <a:latin typeface="Trebuchet MS"/>
+                        <a:ea typeface="Times New Roman"/>
+                        <a:cs typeface="Trebuchet MS"/>
+                      </a:endParaRPr>
+                    </a:p>
+                  </a:txBody>
+                  <a:tcPr marL="68580" marR="68580" marT="0" marB="0"/>
+                </a:tc>
+                <a:tc>
+                  <a:txBody>
+                    <a:bodyPr/>
+                    <a:lstStyle/>
+                    <a:p>
+                      <a:r>
+                        <a:rPr lang="en-US" sz="1800" b="1" kern="1200" dirty="0" smtClean="0">
+                          <a:solidFill>
+                            <a:schemeClr val="lt1"/>
+                          </a:solidFill>
+                          <a:latin typeface="+mn-lt"/>
+                          <a:ea typeface="+mn-ea"/>
+                          <a:cs typeface="+mn-cs"/>
+                        </a:rPr>
+                        <a:t>GIAPI Observation Event</a:t>
+                      </a:r>
+                      <a:r>
+                        <a:rPr lang="en-US" dirty="0" smtClean="0"/>
+                        <a:t> </a:t>
+                      </a:r>
+                      <a:endParaRPr lang="en-US" dirty="0"/>
+                    </a:p>
+                  </a:txBody>
+                  <a:tcPr/>
+                </a:tc>
+                <a:tc>
+                  <a:txBody>
+                    <a:bodyPr/>
+                    <a:lstStyle/>
+                    <a:p>
+                      <a:r>
+                        <a:rPr lang="en-US" dirty="0" smtClean="0"/>
+                        <a:t>Used</a:t>
+                      </a:r>
+                      <a:r>
+                        <a:rPr lang="en-US" baseline="0" dirty="0" smtClean="0"/>
+                        <a:t> in GDS</a:t>
+                      </a:r>
+                      <a:endParaRPr lang="en-US" dirty="0"/>
+                    </a:p>
+                  </a:txBody>
+                  <a:tcPr/>
+                </a:tc>
+              </a:tr>
+              <a:tr h="466720">
+                <a:tc>
+                  <a:txBody>
+                    <a:bodyPr/>
+                    <a:lstStyle/>
+                    <a:p>
+                      <a:pPr algn="ctr"/>
+                      <a:r>
+                        <a:rPr lang="en-US" dirty="0" smtClean="0"/>
+                        <a:t>T1</a:t>
+                      </a:r>
+                      <a:endParaRPr lang="en-US" dirty="0"/>
+                    </a:p>
+                  </a:txBody>
+                  <a:tcPr anchor="ctr"/>
+                </a:tc>
+                <a:tc>
+                  <a:txBody>
+                    <a:bodyPr/>
+                    <a:lstStyle/>
+                    <a:p>
+                      <a:r>
+                        <a:rPr lang="en-US" sz="1800" kern="1200" dirty="0" smtClean="0">
+                          <a:solidFill>
+                            <a:schemeClr val="dk1"/>
+                          </a:solidFill>
+                          <a:latin typeface="+mn-lt"/>
+                          <a:ea typeface="+mn-ea"/>
+                          <a:cs typeface="+mn-cs"/>
+                        </a:rPr>
+                        <a:t>OBS_PREP</a:t>
+                      </a:r>
+                      <a:r>
+                        <a:rPr lang="en-US" dirty="0" smtClean="0"/>
+                        <a:t> </a:t>
+                      </a:r>
+                      <a:endParaRPr lang="en-US" dirty="0"/>
+                    </a:p>
+                  </a:txBody>
+                  <a:tcPr/>
+                </a:tc>
+                <a:tc>
+                  <a:txBody>
+                    <a:bodyPr/>
+                    <a:lstStyle/>
+                    <a:p>
+                      <a:pPr algn="ctr"/>
+                      <a:r>
+                        <a:rPr lang="en-US" dirty="0" smtClean="0"/>
+                        <a:t>Yes</a:t>
+                      </a:r>
+                      <a:endParaRPr lang="en-US" dirty="0"/>
+                    </a:p>
+                  </a:txBody>
+                  <a:tcPr/>
+                </a:tc>
+              </a:tr>
+              <a:tr h="466720">
+                <a:tc>
+                  <a:txBody>
+                    <a:bodyPr/>
+                    <a:lstStyle/>
+                    <a:p>
+                      <a:pPr algn="ctr"/>
+                      <a:r>
+                        <a:rPr lang="en-US" dirty="0" smtClean="0"/>
+                        <a:t>T2</a:t>
+                      </a:r>
+                      <a:endParaRPr lang="en-US" dirty="0"/>
+                    </a:p>
+                  </a:txBody>
+                  <a:tcPr anchor="ctr"/>
+                </a:tc>
+                <a:tc>
+                  <a:txBody>
+                    <a:bodyPr/>
+                    <a:lstStyle/>
+                    <a:p>
+                      <a:r>
+                        <a:rPr lang="en-US" sz="1800" kern="1200" dirty="0" smtClean="0">
+                          <a:solidFill>
+                            <a:schemeClr val="dk1"/>
+                          </a:solidFill>
+                          <a:latin typeface="+mn-lt"/>
+                          <a:ea typeface="+mn-ea"/>
+                          <a:cs typeface="+mn-cs"/>
+                        </a:rPr>
+                        <a:t>OBS_START_ACQ</a:t>
+                      </a:r>
+                      <a:r>
+                        <a:rPr lang="en-US" dirty="0" smtClean="0"/>
+                        <a:t> </a:t>
+                      </a:r>
+                      <a:endParaRPr lang="en-US" dirty="0"/>
+                    </a:p>
+                  </a:txBody>
+                  <a:tcPr/>
+                </a:tc>
+                <a:tc>
+                  <a:txBody>
+                    <a:bodyPr/>
+                    <a:lstStyle/>
+                    <a:p>
+                      <a:pPr algn="ctr"/>
+                      <a:r>
+                        <a:rPr lang="en-US" dirty="0" smtClean="0"/>
+                        <a:t>Yes</a:t>
+                      </a:r>
+                      <a:endParaRPr lang="en-US" dirty="0"/>
+                    </a:p>
+                  </a:txBody>
+                  <a:tcPr/>
+                </a:tc>
+              </a:tr>
+              <a:tr h="466720">
+                <a:tc>
+                  <a:txBody>
+                    <a:bodyPr/>
+                    <a:lstStyle/>
+                    <a:p>
+                      <a:pPr algn="ctr"/>
+                      <a:r>
+                        <a:rPr lang="en-US" dirty="0" smtClean="0"/>
+                        <a:t>T3</a:t>
+                      </a:r>
+                      <a:endParaRPr lang="en-US" dirty="0"/>
+                    </a:p>
+                  </a:txBody>
+                  <a:tcPr anchor="ctr"/>
+                </a:tc>
+                <a:tc>
+                  <a:txBody>
+                    <a:bodyPr/>
+                    <a:lstStyle/>
+                    <a:p>
+                      <a:r>
+                        <a:rPr lang="en-US" sz="1800" kern="1200" dirty="0" smtClean="0">
+                          <a:solidFill>
+                            <a:schemeClr val="dk1"/>
+                          </a:solidFill>
+                          <a:latin typeface="+mn-lt"/>
+                          <a:ea typeface="+mn-ea"/>
+                          <a:cs typeface="+mn-cs"/>
+                        </a:rPr>
+                        <a:t>OBS_END_ACQ</a:t>
+                      </a:r>
+                      <a:r>
+                        <a:rPr lang="en-US" dirty="0" smtClean="0"/>
+                        <a:t> </a:t>
+                      </a:r>
+                      <a:endParaRPr lang="en-US" dirty="0"/>
+                    </a:p>
+                  </a:txBody>
+                  <a:tcPr/>
+                </a:tc>
+                <a:tc>
+                  <a:txBody>
+                    <a:bodyPr/>
+                    <a:lstStyle/>
+                    <a:p>
+                      <a:pPr algn="ctr"/>
+                      <a:r>
+                        <a:rPr lang="en-US" dirty="0" smtClean="0"/>
+                        <a:t>Yes</a:t>
+                      </a:r>
+                      <a:endParaRPr lang="en-US" dirty="0"/>
+                    </a:p>
+                  </a:txBody>
+                  <a:tcPr/>
+                </a:tc>
+              </a:tr>
+              <a:tr h="466720">
+                <a:tc>
+                  <a:txBody>
+                    <a:bodyPr/>
+                    <a:lstStyle/>
+                    <a:p>
+                      <a:pPr algn="ctr"/>
+                      <a:r>
+                        <a:rPr lang="en-US" dirty="0" smtClean="0"/>
+                        <a:t>T4</a:t>
+                      </a:r>
+                      <a:endParaRPr lang="en-US" dirty="0"/>
+                    </a:p>
+                  </a:txBody>
+                  <a:tcPr anchor="ctr"/>
+                </a:tc>
+                <a:tc>
+                  <a:txBody>
+                    <a:bodyPr/>
+                    <a:lstStyle/>
+                    <a:p>
+                      <a:r>
+                        <a:rPr lang="en-US" sz="1800" kern="1200" dirty="0" smtClean="0">
+                          <a:solidFill>
+                            <a:schemeClr val="dk1"/>
+                          </a:solidFill>
+                          <a:latin typeface="+mn-lt"/>
+                          <a:ea typeface="+mn-ea"/>
+                          <a:cs typeface="+mn-cs"/>
+                        </a:rPr>
+                        <a:t>OBS_START_READOUT</a:t>
+                      </a:r>
+                      <a:r>
+                        <a:rPr lang="en-US" dirty="0" smtClean="0"/>
+                        <a:t> </a:t>
+                      </a:r>
+                      <a:endParaRPr lang="en-US" dirty="0"/>
+                    </a:p>
+                  </a:txBody>
+                  <a:tcPr/>
+                </a:tc>
+                <a:tc>
+                  <a:txBody>
+                    <a:bodyPr/>
+                    <a:lstStyle/>
+                    <a:p>
+                      <a:pPr algn="ctr"/>
+                      <a:r>
+                        <a:rPr lang="en-US" dirty="0" smtClean="0"/>
+                        <a:t>No</a:t>
+                      </a:r>
+                      <a:endParaRPr lang="en-US" dirty="0"/>
+                    </a:p>
+                  </a:txBody>
+                  <a:tcPr/>
+                </a:tc>
+              </a:tr>
+              <a:tr h="466720">
+                <a:tc>
+                  <a:txBody>
+                    <a:bodyPr/>
+                    <a:lstStyle/>
+                    <a:p>
+                      <a:pPr algn="ctr"/>
+                      <a:r>
+                        <a:rPr lang="en-US" dirty="0" smtClean="0"/>
+                        <a:t>T5</a:t>
+                      </a:r>
+                      <a:endParaRPr lang="en-US" dirty="0"/>
+                    </a:p>
+                  </a:txBody>
+                  <a:tcPr anchor="ctr"/>
+                </a:tc>
+                <a:tc>
+                  <a:txBody>
+                    <a:bodyPr/>
+                    <a:lstStyle/>
+                    <a:p>
+                      <a:r>
+                        <a:rPr lang="en-US" sz="1800" kern="1200" dirty="0" smtClean="0">
+                          <a:solidFill>
+                            <a:schemeClr val="dk1"/>
+                          </a:solidFill>
+                          <a:latin typeface="+mn-lt"/>
+                          <a:ea typeface="+mn-ea"/>
+                          <a:cs typeface="+mn-cs"/>
+                        </a:rPr>
+                        <a:t>OBS_END_READOUT</a:t>
+                      </a:r>
+                      <a:r>
+                        <a:rPr lang="en-US" dirty="0" smtClean="0"/>
+                        <a:t> </a:t>
+                      </a:r>
+                      <a:endParaRPr lang="en-US" dirty="0"/>
+                    </a:p>
+                  </a:txBody>
+                  <a:tcPr/>
+                </a:tc>
+                <a:tc>
+                  <a:txBody>
+                    <a:bodyPr/>
+                    <a:lstStyle/>
+                    <a:p>
+                      <a:pPr algn="ctr"/>
+                      <a:r>
+                        <a:rPr lang="en-US" dirty="0" smtClean="0"/>
+                        <a:t>No</a:t>
+                      </a:r>
+                      <a:endParaRPr lang="en-US" dirty="0"/>
+                    </a:p>
+                  </a:txBody>
+                  <a:tcPr/>
+                </a:tc>
+              </a:tr>
+              <a:tr h="466720">
+                <a:tc>
+                  <a:txBody>
+                    <a:bodyPr/>
+                    <a:lstStyle/>
+                    <a:p>
+                      <a:pPr algn="ctr"/>
+                      <a:r>
+                        <a:rPr lang="en-US" dirty="0" smtClean="0"/>
+                        <a:t>T6</a:t>
+                      </a:r>
+                      <a:endParaRPr lang="en-US" dirty="0"/>
+                    </a:p>
+                  </a:txBody>
+                  <a:tcPr anchor="ctr"/>
+                </a:tc>
+                <a:tc>
+                  <a:txBody>
+                    <a:bodyPr/>
+                    <a:lstStyle/>
+                    <a:p>
+                      <a:r>
+                        <a:rPr lang="en-US" sz="1800" kern="1200" dirty="0" smtClean="0">
+                          <a:solidFill>
+                            <a:schemeClr val="dk1"/>
+                          </a:solidFill>
+                          <a:latin typeface="+mn-lt"/>
+                          <a:ea typeface="+mn-ea"/>
+                          <a:cs typeface="+mn-cs"/>
+                        </a:rPr>
+                        <a:t>OBS_START_DSET_WRITE</a:t>
+                      </a:r>
+                      <a:r>
+                        <a:rPr lang="en-US" dirty="0" smtClean="0"/>
+                        <a:t> </a:t>
+                      </a:r>
+                      <a:endParaRPr lang="en-US" dirty="0"/>
+                    </a:p>
+                  </a:txBody>
+                  <a:tcPr/>
+                </a:tc>
+                <a:tc>
+                  <a:txBody>
+                    <a:bodyPr/>
+                    <a:lstStyle/>
+                    <a:p>
+                      <a:pPr algn="ctr"/>
+                      <a:r>
+                        <a:rPr lang="en-US" dirty="0" smtClean="0"/>
+                        <a:t>No</a:t>
+                      </a:r>
+                      <a:endParaRPr lang="en-US" dirty="0"/>
+                    </a:p>
+                  </a:txBody>
+                  <a:tcPr/>
+                </a:tc>
+              </a:tr>
+              <a:tr h="466720">
+                <a:tc>
+                  <a:txBody>
+                    <a:bodyPr/>
+                    <a:lstStyle/>
+                    <a:p>
+                      <a:pPr algn="ctr"/>
+                      <a:r>
+                        <a:rPr lang="en-US" dirty="0" smtClean="0"/>
+                        <a:t>T7</a:t>
+                      </a:r>
+                      <a:endParaRPr lang="en-US" dirty="0"/>
+                    </a:p>
+                  </a:txBody>
+                  <a:tcPr anchor="ctr"/>
+                </a:tc>
+                <a:tc>
+                  <a:txBody>
+                    <a:bodyPr/>
+                    <a:lstStyle/>
+                    <a:p>
+                      <a:r>
+                        <a:rPr lang="en-US" sz="1800" kern="1200" dirty="0" smtClean="0">
+                          <a:solidFill>
+                            <a:schemeClr val="dk1"/>
+                          </a:solidFill>
+                          <a:latin typeface="+mn-lt"/>
+                          <a:ea typeface="+mn-ea"/>
+                          <a:cs typeface="+mn-cs"/>
+                        </a:rPr>
+                        <a:t>OBS_END_DSET_WRITE</a:t>
+                      </a:r>
+                      <a:r>
+                        <a:rPr lang="en-US" dirty="0" smtClean="0"/>
+                        <a:t> </a:t>
+                      </a:r>
+                      <a:endParaRPr lang="en-US" dirty="0"/>
+                    </a:p>
+                  </a:txBody>
+                  <a:tcPr/>
+                </a:tc>
+                <a:tc>
+                  <a:txBody>
+                    <a:bodyPr/>
+                    <a:lstStyle/>
+                    <a:p>
+                      <a:pPr algn="ctr"/>
+                      <a:r>
+                        <a:rPr lang="en-US" dirty="0" smtClean="0"/>
+                        <a:t>Yes</a:t>
+                      </a:r>
+                      <a:endParaRPr lang="en-US" dirty="0"/>
+                    </a:p>
+                  </a:txBody>
+                  <a:tcPr/>
+                </a:tc>
+              </a:tr>
+            </a:tbl>
+          </a:graphicData>
+        </a:graphic>
+      </p:graphicFrame>
     </p:spTree>
   </p:cSld>
   <p:clrMapOvr>

</xml_diff>